<commit_message>
update figures in powerpoint
</commit_message>
<xml_diff>
--- a/CFBPresentation.pptx
+++ b/CFBPresentation.pptx
@@ -13,12 +13,13 @@
     <p:sldId id="264" r:id="rId7"/>
     <p:sldId id="265" r:id="rId8"/>
     <p:sldId id="266" r:id="rId9"/>
-    <p:sldId id="267" r:id="rId10"/>
-    <p:sldId id="268" r:id="rId11"/>
-    <p:sldId id="269" r:id="rId12"/>
-    <p:sldId id="260" r:id="rId13"/>
-    <p:sldId id="261" r:id="rId14"/>
-    <p:sldId id="262" r:id="rId15"/>
+    <p:sldId id="270" r:id="rId10"/>
+    <p:sldId id="267" r:id="rId11"/>
+    <p:sldId id="268" r:id="rId12"/>
+    <p:sldId id="269" r:id="rId13"/>
+    <p:sldId id="260" r:id="rId14"/>
+    <p:sldId id="261" r:id="rId15"/>
+    <p:sldId id="262" r:id="rId16"/>
   </p:sldIdLst>
   <p:sldSz cx="12192000" cy="6858000"/>
   <p:notesSz cx="6858000" cy="9144000"/>
@@ -3921,10 +3922,76 @@
       </p:grpSpPr>
       <p:pic>
         <p:nvPicPr>
-          <p:cNvPr id="3" name="Picture 2" descr="A picture containing air, various, different, bunch&#10;&#10;Description automatically generated">
+          <p:cNvPr id="4" name="Picture 3" descr="A close up of a map&#10;&#10;Description automatically generated">
             <a:extLst>
               <a:ext uri="{FF2B5EF4-FFF2-40B4-BE49-F238E27FC236}">
-                <a16:creationId xmlns:a16="http://schemas.microsoft.com/office/drawing/2014/main" id="{DFBB479C-F266-434C-9EB0-7C128434C92E}"/>
+                <a16:creationId xmlns:a16="http://schemas.microsoft.com/office/drawing/2014/main" id="{F56B1492-6DFD-486C-A054-3F5DE0151D8E}"/>
+              </a:ext>
+            </a:extLst>
+          </p:cNvPr>
+          <p:cNvPicPr>
+            <a:picLocks noChangeAspect="1"/>
+          </p:cNvPicPr>
+          <p:nvPr/>
+        </p:nvPicPr>
+        <p:blipFill>
+          <a:blip r:embed="rId2">
+            <a:extLst>
+              <a:ext uri="{28A0092B-C50C-407E-A947-70E740481C1C}">
+                <a14:useLocalDpi xmlns:a14="http://schemas.microsoft.com/office/drawing/2010/main" val="0"/>
+              </a:ext>
+            </a:extLst>
+          </a:blip>
+          <a:stretch>
+            <a:fillRect/>
+          </a:stretch>
+        </p:blipFill>
+        <p:spPr>
+          <a:xfrm>
+            <a:off x="0" y="381000"/>
+            <a:ext cx="12192000" cy="6096000"/>
+          </a:xfrm>
+          <a:prstGeom prst="rect">
+            <a:avLst/>
+          </a:prstGeom>
+        </p:spPr>
+      </p:pic>
+    </p:spTree>
+    <p:extLst>
+      <p:ext uri="{BB962C8B-B14F-4D97-AF65-F5344CB8AC3E}">
+        <p14:creationId xmlns:p14="http://schemas.microsoft.com/office/powerpoint/2010/main" val="1597046657"/>
+      </p:ext>
+    </p:extLst>
+  </p:cSld>
+  <p:clrMapOvr>
+    <a:masterClrMapping/>
+  </p:clrMapOvr>
+</p:sld>
+</file>
+
+<file path=ppt/slides/slide11.xml><?xml version="1.0" encoding="utf-8"?>
+<p:sld xmlns:a="http://schemas.openxmlformats.org/drawingml/2006/main" xmlns:r="http://schemas.openxmlformats.org/officeDocument/2006/relationships" xmlns:p="http://schemas.openxmlformats.org/presentationml/2006/main">
+  <p:cSld>
+    <p:spTree>
+      <p:nvGrpSpPr>
+        <p:cNvPr id="1" name=""/>
+        <p:cNvGrpSpPr/>
+        <p:nvPr/>
+      </p:nvGrpSpPr>
+      <p:grpSpPr>
+        <a:xfrm>
+          <a:off x="0" y="0"/>
+          <a:ext cx="0" cy="0"/>
+          <a:chOff x="0" y="0"/>
+          <a:chExt cx="0" cy="0"/>
+        </a:xfrm>
+      </p:grpSpPr>
+      <p:pic>
+        <p:nvPicPr>
+          <p:cNvPr id="6" name="Picture 5" descr="A picture containing table, different, man, various&#10;&#10;Description automatically generated">
+            <a:extLst>
+              <a:ext uri="{FF2B5EF4-FFF2-40B4-BE49-F238E27FC236}">
+                <a16:creationId xmlns:a16="http://schemas.microsoft.com/office/drawing/2014/main" id="{B55B8E73-2E74-4A6E-9D47-36BCF98C780F}"/>
               </a:ext>
             </a:extLst>
           </p:cNvPr>
@@ -3968,7 +4035,7 @@
 </p:sld>
 </file>
 
-<file path=ppt/slides/slide11.xml><?xml version="1.0" encoding="utf-8"?>
+<file path=ppt/slides/slide12.xml><?xml version="1.0" encoding="utf-8"?>
 <p:sld xmlns:a="http://schemas.openxmlformats.org/drawingml/2006/main" xmlns:r="http://schemas.openxmlformats.org/officeDocument/2006/relationships" xmlns:p="http://schemas.openxmlformats.org/presentationml/2006/main">
   <p:cSld>
     <p:spTree>
@@ -3987,10 +4054,10 @@
       </p:grpSpPr>
       <p:pic>
         <p:nvPicPr>
-          <p:cNvPr id="3" name="Picture 2" descr="A close up of a map&#10;&#10;Description automatically generated">
+          <p:cNvPr id="8" name="Picture 7" descr="A close up of a map&#10;&#10;Description automatically generated">
             <a:extLst>
               <a:ext uri="{FF2B5EF4-FFF2-40B4-BE49-F238E27FC236}">
-                <a16:creationId xmlns:a16="http://schemas.microsoft.com/office/drawing/2014/main" id="{35855E13-D331-443A-8500-BC185875F2D5}"/>
+                <a16:creationId xmlns:a16="http://schemas.microsoft.com/office/drawing/2014/main" id="{816DE891-60E9-4B5C-BBAB-162F20188207}"/>
               </a:ext>
             </a:extLst>
           </p:cNvPr>
@@ -4034,173 +4101,6 @@
 </p:sld>
 </file>
 
-<file path=ppt/slides/slide12.xml><?xml version="1.0" encoding="utf-8"?>
-<p:sld xmlns:a="http://schemas.openxmlformats.org/drawingml/2006/main" xmlns:r="http://schemas.openxmlformats.org/officeDocument/2006/relationships" xmlns:p="http://schemas.openxmlformats.org/presentationml/2006/main">
-  <p:cSld>
-    <p:spTree>
-      <p:nvGrpSpPr>
-        <p:cNvPr id="1" name=""/>
-        <p:cNvGrpSpPr/>
-        <p:nvPr/>
-      </p:nvGrpSpPr>
-      <p:grpSpPr>
-        <a:xfrm>
-          <a:off x="0" y="0"/>
-          <a:ext cx="0" cy="0"/>
-          <a:chOff x="0" y="0"/>
-          <a:chExt cx="0" cy="0"/>
-        </a:xfrm>
-      </p:grpSpPr>
-      <p:sp>
-        <p:nvSpPr>
-          <p:cNvPr id="2" name="Title 1">
-            <a:extLst>
-              <a:ext uri="{FF2B5EF4-FFF2-40B4-BE49-F238E27FC236}">
-                <a16:creationId xmlns:a16="http://schemas.microsoft.com/office/drawing/2014/main" id="{4E791D14-94D7-48A9-AA38-9D8E69C3BF48}"/>
-              </a:ext>
-            </a:extLst>
-          </p:cNvPr>
-          <p:cNvSpPr>
-            <a:spLocks noGrp="1"/>
-          </p:cNvSpPr>
-          <p:nvPr>
-            <p:ph type="title"/>
-          </p:nvPr>
-        </p:nvSpPr>
-        <p:spPr/>
-        <p:txBody>
-          <a:bodyPr/>
-          <a:lstStyle/>
-          <a:p>
-            <a:r>
-              <a:rPr lang="en-US" b="1" dirty="0"/>
-              <a:t>Recruiting Analysis Findings</a:t>
-            </a:r>
-          </a:p>
-        </p:txBody>
-      </p:sp>
-      <p:sp>
-        <p:nvSpPr>
-          <p:cNvPr id="3" name="Content Placeholder 2">
-            <a:extLst>
-              <a:ext uri="{FF2B5EF4-FFF2-40B4-BE49-F238E27FC236}">
-                <a16:creationId xmlns:a16="http://schemas.microsoft.com/office/drawing/2014/main" id="{10AB1C43-3596-4F36-B3D8-0328527A5CA8}"/>
-              </a:ext>
-            </a:extLst>
-          </p:cNvPr>
-          <p:cNvSpPr>
-            <a:spLocks noGrp="1"/>
-          </p:cNvSpPr>
-          <p:nvPr>
-            <p:ph idx="1"/>
-          </p:nvPr>
-        </p:nvSpPr>
-        <p:spPr>
-          <a:xfrm>
-            <a:off x="1097280" y="1845734"/>
-            <a:ext cx="10058400" cy="4546188"/>
-          </a:xfrm>
-        </p:spPr>
-        <p:txBody>
-          <a:bodyPr>
-            <a:normAutofit/>
-          </a:bodyPr>
-          <a:lstStyle/>
-          <a:p>
-            <a:pPr fontAlgn="base">
-              <a:buFont typeface="Wingdings" panose="05000000000000000000" pitchFamily="2" charset="2"/>
-              <a:buChar char="§"/>
-            </a:pPr>
-            <a:r>
-              <a:rPr lang="en-US" dirty="0"/>
-              <a:t>The current and previous season’s recruiting points have a positive effect on the current season success of a team by both success outcomes</a:t>
-            </a:r>
-          </a:p>
-          <a:p>
-            <a:pPr lvl="1" fontAlgn="base">
-              <a:buFont typeface="Arial" panose="020B0604020202020204" pitchFamily="34" charset="0"/>
-              <a:buChar char="•"/>
-            </a:pPr>
-            <a:r>
-              <a:rPr lang="en-US" dirty="0"/>
-              <a:t>R squared values in the .7 and .8 range</a:t>
-            </a:r>
-          </a:p>
-          <a:p>
-            <a:pPr fontAlgn="base">
-              <a:buFont typeface="Wingdings" panose="05000000000000000000" pitchFamily="2" charset="2"/>
-              <a:buChar char="§"/>
-            </a:pPr>
-            <a:r>
-              <a:rPr lang="en-US" dirty="0"/>
-              <a:t>The previous season’s success outcomes of a team have a positive effect on the recruiting of the current season</a:t>
-            </a:r>
-          </a:p>
-          <a:p>
-            <a:pPr lvl="1" fontAlgn="base">
-              <a:buFont typeface="Arial" panose="020B0604020202020204" pitchFamily="34" charset="0"/>
-              <a:buChar char="•"/>
-            </a:pPr>
-            <a:r>
-              <a:rPr lang="en-US" dirty="0"/>
-              <a:t>R squared in the .7 and .8 range</a:t>
-            </a:r>
-          </a:p>
-          <a:p>
-            <a:pPr lvl="1" fontAlgn="base">
-              <a:buFont typeface="Arial" panose="020B0604020202020204" pitchFamily="34" charset="0"/>
-              <a:buChar char="•"/>
-            </a:pPr>
-            <a:r>
-              <a:rPr lang="en-US" dirty="0"/>
-              <a:t>The previous season’s success outcomes have a higher correlation to the predictive measures of the current season</a:t>
-            </a:r>
-          </a:p>
-          <a:p>
-            <a:pPr fontAlgn="base">
-              <a:buFont typeface="Wingdings" panose="05000000000000000000" pitchFamily="2" charset="2"/>
-              <a:buChar char="§"/>
-            </a:pPr>
-            <a:r>
-              <a:rPr lang="en-US" dirty="0"/>
-              <a:t>When binned by four-year periods to create more data points, the correlation was less.</a:t>
-            </a:r>
-          </a:p>
-          <a:p>
-            <a:pPr lvl="1" fontAlgn="base">
-              <a:buFont typeface="Arial" panose="020B0604020202020204" pitchFamily="34" charset="0"/>
-              <a:buChar char="•"/>
-            </a:pPr>
-            <a:r>
-              <a:rPr lang="en-US" dirty="0"/>
-              <a:t>R squared of .61</a:t>
-            </a:r>
-          </a:p>
-          <a:p>
-            <a:pPr fontAlgn="base">
-              <a:buFont typeface="Wingdings" panose="05000000000000000000" pitchFamily="2" charset="2"/>
-              <a:buChar char="§"/>
-            </a:pPr>
-            <a:r>
-              <a:rPr lang="en-US" dirty="0"/>
-              <a:t>You can create some cool looking figures that give you no real conclusion or that take forever to decipher</a:t>
-            </a:r>
-          </a:p>
-        </p:txBody>
-      </p:sp>
-    </p:spTree>
-    <p:extLst>
-      <p:ext uri="{BB962C8B-B14F-4D97-AF65-F5344CB8AC3E}">
-        <p14:creationId xmlns:p14="http://schemas.microsoft.com/office/powerpoint/2010/main" val="1243190115"/>
-      </p:ext>
-    </p:extLst>
-  </p:cSld>
-  <p:clrMapOvr>
-    <a:masterClrMapping/>
-  </p:clrMapOvr>
-</p:sld>
-</file>
-
 <file path=ppt/slides/slide13.xml><?xml version="1.0" encoding="utf-8"?>
 <p:sld xmlns:a="http://schemas.openxmlformats.org/drawingml/2006/main" xmlns:r="http://schemas.openxmlformats.org/officeDocument/2006/relationships" xmlns:p="http://schemas.openxmlformats.org/presentationml/2006/main">
   <p:cSld>
@@ -4223,6 +4123,173 @@
           <p:cNvPr id="2" name="Title 1">
             <a:extLst>
               <a:ext uri="{FF2B5EF4-FFF2-40B4-BE49-F238E27FC236}">
+                <a16:creationId xmlns:a16="http://schemas.microsoft.com/office/drawing/2014/main" id="{4E791D14-94D7-48A9-AA38-9D8E69C3BF48}"/>
+              </a:ext>
+            </a:extLst>
+          </p:cNvPr>
+          <p:cNvSpPr>
+            <a:spLocks noGrp="1"/>
+          </p:cNvSpPr>
+          <p:nvPr>
+            <p:ph type="title"/>
+          </p:nvPr>
+        </p:nvSpPr>
+        <p:spPr/>
+        <p:txBody>
+          <a:bodyPr/>
+          <a:lstStyle/>
+          <a:p>
+            <a:r>
+              <a:rPr lang="en-US" b="1" dirty="0"/>
+              <a:t>Recruiting Analysis Findings</a:t>
+            </a:r>
+          </a:p>
+        </p:txBody>
+      </p:sp>
+      <p:sp>
+        <p:nvSpPr>
+          <p:cNvPr id="3" name="Content Placeholder 2">
+            <a:extLst>
+              <a:ext uri="{FF2B5EF4-FFF2-40B4-BE49-F238E27FC236}">
+                <a16:creationId xmlns:a16="http://schemas.microsoft.com/office/drawing/2014/main" id="{10AB1C43-3596-4F36-B3D8-0328527A5CA8}"/>
+              </a:ext>
+            </a:extLst>
+          </p:cNvPr>
+          <p:cNvSpPr>
+            <a:spLocks noGrp="1"/>
+          </p:cNvSpPr>
+          <p:nvPr>
+            <p:ph idx="1"/>
+          </p:nvPr>
+        </p:nvSpPr>
+        <p:spPr>
+          <a:xfrm>
+            <a:off x="1097280" y="1845734"/>
+            <a:ext cx="10058400" cy="4546188"/>
+          </a:xfrm>
+        </p:spPr>
+        <p:txBody>
+          <a:bodyPr>
+            <a:normAutofit/>
+          </a:bodyPr>
+          <a:lstStyle/>
+          <a:p>
+            <a:pPr fontAlgn="base">
+              <a:buFont typeface="Wingdings" panose="05000000000000000000" pitchFamily="2" charset="2"/>
+              <a:buChar char="§"/>
+            </a:pPr>
+            <a:r>
+              <a:rPr lang="en-US" dirty="0"/>
+              <a:t>The current and previous season’s recruiting points have a positive effect on the current season success of a team by both success outcomes</a:t>
+            </a:r>
+          </a:p>
+          <a:p>
+            <a:pPr lvl="1" fontAlgn="base">
+              <a:buFont typeface="Arial" panose="020B0604020202020204" pitchFamily="34" charset="0"/>
+              <a:buChar char="•"/>
+            </a:pPr>
+            <a:r>
+              <a:rPr lang="en-US" dirty="0"/>
+              <a:t>R squared values in the .7 and .8 range</a:t>
+            </a:r>
+          </a:p>
+          <a:p>
+            <a:pPr fontAlgn="base">
+              <a:buFont typeface="Wingdings" panose="05000000000000000000" pitchFamily="2" charset="2"/>
+              <a:buChar char="§"/>
+            </a:pPr>
+            <a:r>
+              <a:rPr lang="en-US" dirty="0"/>
+              <a:t>The previous season’s success outcomes of a team have a positive effect on the recruiting of the current season</a:t>
+            </a:r>
+          </a:p>
+          <a:p>
+            <a:pPr lvl="1" fontAlgn="base">
+              <a:buFont typeface="Arial" panose="020B0604020202020204" pitchFamily="34" charset="0"/>
+              <a:buChar char="•"/>
+            </a:pPr>
+            <a:r>
+              <a:rPr lang="en-US" dirty="0"/>
+              <a:t>R squared in the .7 and .8 range</a:t>
+            </a:r>
+          </a:p>
+          <a:p>
+            <a:pPr lvl="1" fontAlgn="base">
+              <a:buFont typeface="Arial" panose="020B0604020202020204" pitchFamily="34" charset="0"/>
+              <a:buChar char="•"/>
+            </a:pPr>
+            <a:r>
+              <a:rPr lang="en-US" dirty="0"/>
+              <a:t>The previous season’s success outcomes have a higher correlation to the predictive measures of the current season</a:t>
+            </a:r>
+          </a:p>
+          <a:p>
+            <a:pPr fontAlgn="base">
+              <a:buFont typeface="Wingdings" panose="05000000000000000000" pitchFamily="2" charset="2"/>
+              <a:buChar char="§"/>
+            </a:pPr>
+            <a:r>
+              <a:rPr lang="en-US" dirty="0"/>
+              <a:t>When binned by four-year periods to create more data points, the correlation was less.</a:t>
+            </a:r>
+          </a:p>
+          <a:p>
+            <a:pPr lvl="1" fontAlgn="base">
+              <a:buFont typeface="Arial" panose="020B0604020202020204" pitchFamily="34" charset="0"/>
+              <a:buChar char="•"/>
+            </a:pPr>
+            <a:r>
+              <a:rPr lang="en-US" dirty="0"/>
+              <a:t>R squared of .61</a:t>
+            </a:r>
+          </a:p>
+          <a:p>
+            <a:pPr fontAlgn="base">
+              <a:buFont typeface="Wingdings" panose="05000000000000000000" pitchFamily="2" charset="2"/>
+              <a:buChar char="§"/>
+            </a:pPr>
+            <a:r>
+              <a:rPr lang="en-US" dirty="0"/>
+              <a:t>You can create some cool looking figures that give you no real conclusion or that take forever to decipher</a:t>
+            </a:r>
+          </a:p>
+        </p:txBody>
+      </p:sp>
+    </p:spTree>
+    <p:extLst>
+      <p:ext uri="{BB962C8B-B14F-4D97-AF65-F5344CB8AC3E}">
+        <p14:creationId xmlns:p14="http://schemas.microsoft.com/office/powerpoint/2010/main" val="1243190115"/>
+      </p:ext>
+    </p:extLst>
+  </p:cSld>
+  <p:clrMapOvr>
+    <a:masterClrMapping/>
+  </p:clrMapOvr>
+</p:sld>
+</file>
+
+<file path=ppt/slides/slide14.xml><?xml version="1.0" encoding="utf-8"?>
+<p:sld xmlns:a="http://schemas.openxmlformats.org/drawingml/2006/main" xmlns:r="http://schemas.openxmlformats.org/officeDocument/2006/relationships" xmlns:p="http://schemas.openxmlformats.org/presentationml/2006/main">
+  <p:cSld>
+    <p:spTree>
+      <p:nvGrpSpPr>
+        <p:cNvPr id="1" name=""/>
+        <p:cNvGrpSpPr/>
+        <p:nvPr/>
+      </p:nvGrpSpPr>
+      <p:grpSpPr>
+        <a:xfrm>
+          <a:off x="0" y="0"/>
+          <a:ext cx="0" cy="0"/>
+          <a:chOff x="0" y="0"/>
+          <a:chExt cx="0" cy="0"/>
+        </a:xfrm>
+      </p:grpSpPr>
+      <p:sp>
+        <p:nvSpPr>
+          <p:cNvPr id="2" name="Title 1">
+            <a:extLst>
+              <a:ext uri="{FF2B5EF4-FFF2-40B4-BE49-F238E27FC236}">
                 <a16:creationId xmlns:a16="http://schemas.microsoft.com/office/drawing/2014/main" id="{AC0CBCD7-D872-4770-A58E-19C6B41D679F}"/>
               </a:ext>
             </a:extLst>
@@ -4371,7 +4438,7 @@
 </p:sld>
 </file>
 
-<file path=ppt/slides/slide14.xml><?xml version="1.0" encoding="utf-8"?>
+<file path=ppt/slides/slide15.xml><?xml version="1.0" encoding="utf-8"?>
 <p:sld xmlns:a="http://schemas.openxmlformats.org/drawingml/2006/main" xmlns:r="http://schemas.openxmlformats.org/officeDocument/2006/relationships" xmlns:p="http://schemas.openxmlformats.org/presentationml/2006/main">
   <p:cSld>
     <p:spTree>
@@ -5118,10 +5185,10 @@
       </p:grpSpPr>
       <p:pic>
         <p:nvPicPr>
-          <p:cNvPr id="9" name="Picture 8" descr="A close up of a map&#10;&#10;Description automatically generated">
+          <p:cNvPr id="3" name="Picture 2" descr="A picture containing group, large, table, flying&#10;&#10;Description automatically generated">
             <a:extLst>
               <a:ext uri="{FF2B5EF4-FFF2-40B4-BE49-F238E27FC236}">
-                <a16:creationId xmlns:a16="http://schemas.microsoft.com/office/drawing/2014/main" id="{577B3C92-7C3A-49B4-9A52-234D164FBBB6}"/>
+                <a16:creationId xmlns:a16="http://schemas.microsoft.com/office/drawing/2014/main" id="{BF2E37E9-C057-47A3-92E6-4A524D2F7AA5}"/>
               </a:ext>
             </a:extLst>
           </p:cNvPr>
@@ -5184,10 +5251,10 @@
       </p:grpSpPr>
       <p:pic>
         <p:nvPicPr>
-          <p:cNvPr id="3" name="Picture 2" descr="A picture containing group, filled, different, many&#10;&#10;Description automatically generated">
+          <p:cNvPr id="6" name="Picture 5" descr="A picture containing different, table, many, group&#10;&#10;Description automatically generated">
             <a:extLst>
               <a:ext uri="{FF2B5EF4-FFF2-40B4-BE49-F238E27FC236}">
-                <a16:creationId xmlns:a16="http://schemas.microsoft.com/office/drawing/2014/main" id="{151395FF-E7B0-4B1D-90B0-C46FDF6092E1}"/>
+                <a16:creationId xmlns:a16="http://schemas.microsoft.com/office/drawing/2014/main" id="{01F66959-1376-4FFB-9C12-57727E9BE89D}"/>
               </a:ext>
             </a:extLst>
           </p:cNvPr>
@@ -5250,10 +5317,10 @@
       </p:grpSpPr>
       <p:pic>
         <p:nvPicPr>
-          <p:cNvPr id="5" name="Picture 4" descr="A picture containing water, different, boat, various&#10;&#10;Description automatically generated">
+          <p:cNvPr id="3" name="Picture 2" descr="A picture containing different, table, skiing, group&#10;&#10;Description automatically generated">
             <a:extLst>
               <a:ext uri="{FF2B5EF4-FFF2-40B4-BE49-F238E27FC236}">
-                <a16:creationId xmlns:a16="http://schemas.microsoft.com/office/drawing/2014/main" id="{C64DB9BF-5BDF-4527-937F-E370F2CE15A7}"/>
+                <a16:creationId xmlns:a16="http://schemas.microsoft.com/office/drawing/2014/main" id="{C6456D10-F881-454A-8038-CEC5A2F4A2CE}"/>
               </a:ext>
             </a:extLst>
           </p:cNvPr>
@@ -5316,10 +5383,10 @@
       </p:grpSpPr>
       <p:pic>
         <p:nvPicPr>
-          <p:cNvPr id="3" name="Picture 2" descr="A picture containing filled, different, group, water&#10;&#10;Description automatically generated">
+          <p:cNvPr id="4" name="Picture 3" descr="A picture containing water, small, different, skiing&#10;&#10;Description automatically generated">
             <a:extLst>
               <a:ext uri="{FF2B5EF4-FFF2-40B4-BE49-F238E27FC236}">
-                <a16:creationId xmlns:a16="http://schemas.microsoft.com/office/drawing/2014/main" id="{ACD5F722-1536-4841-B0D7-48642303C6C0}"/>
+                <a16:creationId xmlns:a16="http://schemas.microsoft.com/office/drawing/2014/main" id="{FE794279-EC1E-488A-BEBB-79D0ED10ED1F}"/>
               </a:ext>
             </a:extLst>
           </p:cNvPr>
@@ -5382,10 +5449,10 @@
       </p:grpSpPr>
       <p:pic>
         <p:nvPicPr>
-          <p:cNvPr id="3" name="Picture 2" descr="A close up of a map&#10;&#10;Description automatically generated">
+          <p:cNvPr id="3" name="Picture 2" descr="A picture containing different, man, water, flying&#10;&#10;Description automatically generated">
             <a:extLst>
               <a:ext uri="{FF2B5EF4-FFF2-40B4-BE49-F238E27FC236}">
-                <a16:creationId xmlns:a16="http://schemas.microsoft.com/office/drawing/2014/main" id="{37F5FB71-DE7D-4345-AA3C-9B999F4D5FD0}"/>
+                <a16:creationId xmlns:a16="http://schemas.microsoft.com/office/drawing/2014/main" id="{D494CB5D-8377-4640-92FE-5375E957793E}"/>
               </a:ext>
             </a:extLst>
           </p:cNvPr>
@@ -5419,7 +5486,7 @@
     </p:spTree>
     <p:extLst>
       <p:ext uri="{BB962C8B-B14F-4D97-AF65-F5344CB8AC3E}">
-        <p14:creationId xmlns:p14="http://schemas.microsoft.com/office/powerpoint/2010/main" val="1597046657"/>
+        <p14:creationId xmlns:p14="http://schemas.microsoft.com/office/powerpoint/2010/main" val="458251496"/>
       </p:ext>
     </p:extLst>
   </p:cSld>

</xml_diff>

<commit_message>
clean up figures, work on powerpoint
</commit_message>
<xml_diff>
--- a/CFBPresentation.pptx
+++ b/CFBPresentation.pptx
@@ -5078,7 +5078,7 @@
         </p:nvSpPr>
         <p:spPr/>
         <p:txBody>
-          <a:bodyPr>
+          <a:bodyPr numCol="2">
             <a:normAutofit/>
           </a:bodyPr>
           <a:lstStyle/>
@@ -5115,12 +5115,6 @@
             <a:pPr marL="0" indent="0" fontAlgn="base">
               <a:buNone/>
             </a:pPr>
-            <a:endParaRPr lang="en-US" sz="2800" b="1" dirty="0"/>
-          </a:p>
-          <a:p>
-            <a:pPr marL="0" indent="0" fontAlgn="base">
-              <a:buNone/>
-            </a:pPr>
             <a:r>
               <a:rPr lang="en-US" sz="2800" b="1" dirty="0"/>
               <a:t>Success Outcomes</a:t>
@@ -5149,6 +5143,81 @@
               <a:rPr lang="en-US" sz="2400" b="1" dirty="0"/>
               <a:t>   </a:t>
             </a:r>
+          </a:p>
+          <a:p>
+            <a:pPr marL="0" fontAlgn="base">
+              <a:buNone/>
+            </a:pPr>
+            <a:endParaRPr lang="en-US" sz="2600" b="1" dirty="0"/>
+          </a:p>
+          <a:p>
+            <a:pPr marL="0" fontAlgn="base">
+              <a:buNone/>
+            </a:pPr>
+            <a:endParaRPr lang="en-US" sz="2600" b="1" dirty="0"/>
+          </a:p>
+          <a:p>
+            <a:pPr marL="0" fontAlgn="base">
+              <a:buNone/>
+            </a:pPr>
+            <a:r>
+              <a:rPr lang="en-US" sz="2800" b="1" dirty="0"/>
+              <a:t>Methods</a:t>
+            </a:r>
+          </a:p>
+          <a:p>
+            <a:pPr marL="544068" lvl="1" indent="-342900" fontAlgn="base">
+              <a:buFont typeface="Arial" panose="020B0604020202020204" pitchFamily="34" charset="0"/>
+              <a:buChar char="•"/>
+            </a:pPr>
+            <a:r>
+              <a:rPr lang="en-US" sz="2400" dirty="0"/>
+              <a:t>Linear regression</a:t>
+            </a:r>
+          </a:p>
+          <a:p>
+            <a:pPr marL="544068" lvl="1" indent="-342900" fontAlgn="base">
+              <a:buFont typeface="Arial" panose="020B0604020202020204" pitchFamily="34" charset="0"/>
+              <a:buChar char="•"/>
+            </a:pPr>
+            <a:r>
+              <a:rPr lang="en-US" sz="2400" dirty="0"/>
+              <a:t>Binning</a:t>
+            </a:r>
+          </a:p>
+          <a:p>
+            <a:pPr marL="544068" lvl="1" indent="-342900" fontAlgn="base">
+              <a:buFont typeface="Arial" panose="020B0604020202020204" pitchFamily="34" charset="0"/>
+              <a:buChar char="•"/>
+            </a:pPr>
+            <a:r>
+              <a:rPr lang="en-US" sz="2400" dirty="0"/>
+              <a:t>Plots</a:t>
+            </a:r>
+          </a:p>
+          <a:p>
+            <a:pPr marL="566928" lvl="3" indent="0" fontAlgn="base">
+              <a:buNone/>
+            </a:pPr>
+            <a:r>
+              <a:rPr lang="en-US" sz="2000" dirty="0"/>
+              <a:t>Histogram</a:t>
+            </a:r>
+          </a:p>
+          <a:p>
+            <a:pPr marL="566928" lvl="3" indent="0" fontAlgn="base">
+              <a:buNone/>
+            </a:pPr>
+            <a:r>
+              <a:rPr lang="en-US" sz="2000" dirty="0"/>
+              <a:t>Scatter plot</a:t>
+            </a:r>
+          </a:p>
+          <a:p>
+            <a:pPr marL="544068" lvl="1" indent="-342900" fontAlgn="base">
+              <a:buFont typeface="Arial" panose="020B0604020202020204" pitchFamily="34" charset="0"/>
+              <a:buChar char="•"/>
+            </a:pPr>
             <a:endParaRPr lang="en-US" sz="2400" dirty="0"/>
           </a:p>
         </p:txBody>

</xml_diff>

<commit_message>
Small code changes and figure changes. Added key figures to PPT for play calling analysis
</commit_message>
<xml_diff>
--- a/CFBPresentation.pptx
+++ b/CFBPresentation.pptx
@@ -17,8 +17,13 @@
     <p:sldId id="268" r:id="rId11"/>
     <p:sldId id="269" r:id="rId12"/>
     <p:sldId id="260" r:id="rId13"/>
-    <p:sldId id="261" r:id="rId14"/>
-    <p:sldId id="262" r:id="rId15"/>
+    <p:sldId id="270" r:id="rId14"/>
+    <p:sldId id="272" r:id="rId15"/>
+    <p:sldId id="271" r:id="rId16"/>
+    <p:sldId id="273" r:id="rId17"/>
+    <p:sldId id="274" r:id="rId18"/>
+    <p:sldId id="261" r:id="rId19"/>
+    <p:sldId id="262" r:id="rId20"/>
   </p:sldIdLst>
   <p:sldSz cx="12192000" cy="6858000"/>
   <p:notesSz cx="6858000" cy="9144000"/>
@@ -359,7 +364,7 @@
           <a:p>
             <a:fld id="{2306057D-A193-4CDB-AD4E-0222AF2C9990}" type="datetimeFigureOut">
               <a:rPr lang="en-US" smtClean="0"/>
-              <a:t>1/16/2020</a:t>
+              <a:t>1/16/20</a:t>
             </a:fld>
             <a:endParaRPr lang="en-US"/>
           </a:p>
@@ -567,7 +572,7 @@
           <a:p>
             <a:fld id="{2306057D-A193-4CDB-AD4E-0222AF2C9990}" type="datetimeFigureOut">
               <a:rPr lang="en-US" smtClean="0"/>
-              <a:t>1/16/2020</a:t>
+              <a:t>1/16/20</a:t>
             </a:fld>
             <a:endParaRPr lang="en-US"/>
           </a:p>
@@ -823,7 +828,7 @@
           <a:p>
             <a:fld id="{2306057D-A193-4CDB-AD4E-0222AF2C9990}" type="datetimeFigureOut">
               <a:rPr lang="en-US" smtClean="0"/>
-              <a:t>1/16/2020</a:t>
+              <a:t>1/16/20</a:t>
             </a:fld>
             <a:endParaRPr lang="en-US"/>
           </a:p>
@@ -993,7 +998,7 @@
           <a:p>
             <a:fld id="{2306057D-A193-4CDB-AD4E-0222AF2C9990}" type="datetimeFigureOut">
               <a:rPr lang="en-US" smtClean="0"/>
-              <a:t>1/16/2020</a:t>
+              <a:t>1/16/20</a:t>
             </a:fld>
             <a:endParaRPr lang="en-US"/>
           </a:p>
@@ -1328,7 +1333,7 @@
           <a:p>
             <a:fld id="{2306057D-A193-4CDB-AD4E-0222AF2C9990}" type="datetimeFigureOut">
               <a:rPr lang="en-US" smtClean="0"/>
-              <a:t>1/16/2020</a:t>
+              <a:t>1/16/20</a:t>
             </a:fld>
             <a:endParaRPr lang="en-US"/>
           </a:p>
@@ -1603,7 +1608,7 @@
           <a:p>
             <a:fld id="{2306057D-A193-4CDB-AD4E-0222AF2C9990}" type="datetimeFigureOut">
               <a:rPr lang="en-US" smtClean="0"/>
-              <a:t>1/16/2020</a:t>
+              <a:t>1/16/20</a:t>
             </a:fld>
             <a:endParaRPr lang="en-US"/>
           </a:p>
@@ -1982,7 +1987,7 @@
           <a:p>
             <a:fld id="{2306057D-A193-4CDB-AD4E-0222AF2C9990}" type="datetimeFigureOut">
               <a:rPr lang="en-US" smtClean="0"/>
-              <a:t>1/16/2020</a:t>
+              <a:t>1/16/20</a:t>
             </a:fld>
             <a:endParaRPr lang="en-US"/>
           </a:p>
@@ -2100,7 +2105,7 @@
           <a:p>
             <a:fld id="{2306057D-A193-4CDB-AD4E-0222AF2C9990}" type="datetimeFigureOut">
               <a:rPr lang="en-US" smtClean="0"/>
-              <a:t>1/16/2020</a:t>
+              <a:t>1/16/20</a:t>
             </a:fld>
             <a:endParaRPr lang="en-US"/>
           </a:p>
@@ -2271,7 +2276,7 @@
           <a:p>
             <a:fld id="{2306057D-A193-4CDB-AD4E-0222AF2C9990}" type="datetimeFigureOut">
               <a:rPr lang="en-US" smtClean="0"/>
-              <a:t>1/16/2020</a:t>
+              <a:t>1/16/20</a:t>
             </a:fld>
             <a:endParaRPr lang="en-US"/>
           </a:p>
@@ -2625,7 +2630,7 @@
           <a:p>
             <a:fld id="{2306057D-A193-4CDB-AD4E-0222AF2C9990}" type="datetimeFigureOut">
               <a:rPr lang="en-US" smtClean="0"/>
-              <a:t>1/16/2020</a:t>
+              <a:t>1/16/20</a:t>
             </a:fld>
             <a:endParaRPr lang="en-US"/>
           </a:p>
@@ -3002,7 +3007,7 @@
           <a:p>
             <a:fld id="{2306057D-A193-4CDB-AD4E-0222AF2C9990}" type="datetimeFigureOut">
               <a:rPr lang="en-US" smtClean="0"/>
-              <a:t>1/16/2020</a:t>
+              <a:t>1/16/20</a:t>
             </a:fld>
             <a:endParaRPr lang="en-US"/>
           </a:p>
@@ -3289,7 +3294,7 @@
           <a:p>
             <a:fld id="{2306057D-A193-4CDB-AD4E-0222AF2C9990}" type="datetimeFigureOut">
               <a:rPr lang="en-US" smtClean="0"/>
-              <a:t>1/16/2020</a:t>
+              <a:t>1/16/20</a:t>
             </a:fld>
             <a:endParaRPr lang="en-US"/>
           </a:p>
@@ -4220,6 +4225,647 @@
       </p:grpSpPr>
       <p:sp>
         <p:nvSpPr>
+          <p:cNvPr id="11" name="Title 10">
+            <a:extLst>
+              <a:ext uri="{FF2B5EF4-FFF2-40B4-BE49-F238E27FC236}">
+                <a16:creationId xmlns:a16="http://schemas.microsoft.com/office/drawing/2014/main" id="{D1DF3760-E9E4-C246-A9CF-6C9B67C7EEDD}"/>
+              </a:ext>
+            </a:extLst>
+          </p:cNvPr>
+          <p:cNvSpPr>
+            <a:spLocks noGrp="1"/>
+          </p:cNvSpPr>
+          <p:nvPr>
+            <p:ph type="title"/>
+          </p:nvPr>
+        </p:nvSpPr>
+        <p:spPr/>
+        <p:txBody>
+          <a:bodyPr/>
+          <a:lstStyle/>
+          <a:p>
+            <a:r>
+              <a:rPr lang="en-US" b="1" dirty="0"/>
+              <a:t>Play Call Analysis – Pass/Run Splits</a:t>
+            </a:r>
+          </a:p>
+        </p:txBody>
+      </p:sp>
+      <p:pic>
+        <p:nvPicPr>
+          <p:cNvPr id="7" name="Content Placeholder 6">
+            <a:extLst>
+              <a:ext uri="{FF2B5EF4-FFF2-40B4-BE49-F238E27FC236}">
+                <a16:creationId xmlns:a16="http://schemas.microsoft.com/office/drawing/2014/main" id="{E74056FF-FFCD-3244-A932-04F05A34E901}"/>
+              </a:ext>
+            </a:extLst>
+          </p:cNvPr>
+          <p:cNvPicPr>
+            <a:picLocks noGrp="1" noChangeAspect="1"/>
+          </p:cNvPicPr>
+          <p:nvPr>
+            <p:ph sz="half" idx="1"/>
+          </p:nvPr>
+        </p:nvPicPr>
+        <p:blipFill>
+          <a:blip r:embed="rId2">
+            <a:extLst>
+              <a:ext uri="{28A0092B-C50C-407E-A947-70E740481C1C}">
+                <a14:useLocalDpi xmlns:a14="http://schemas.microsoft.com/office/drawing/2010/main" val="0"/>
+              </a:ext>
+            </a:extLst>
+          </a:blip>
+          <a:stretch>
+            <a:fillRect/>
+          </a:stretch>
+        </p:blipFill>
+        <p:spPr>
+          <a:xfrm>
+            <a:off x="1096963" y="2211388"/>
+            <a:ext cx="4938712" cy="3292474"/>
+          </a:xfrm>
+        </p:spPr>
+      </p:pic>
+      <p:pic>
+        <p:nvPicPr>
+          <p:cNvPr id="9" name="Content Placeholder 8">
+            <a:extLst>
+              <a:ext uri="{FF2B5EF4-FFF2-40B4-BE49-F238E27FC236}">
+                <a16:creationId xmlns:a16="http://schemas.microsoft.com/office/drawing/2014/main" id="{4BB333BE-0A87-B848-977E-E0773D3258AA}"/>
+              </a:ext>
+            </a:extLst>
+          </p:cNvPr>
+          <p:cNvPicPr>
+            <a:picLocks noGrp="1" noChangeAspect="1"/>
+          </p:cNvPicPr>
+          <p:nvPr>
+            <p:ph sz="half" idx="2"/>
+          </p:nvPr>
+        </p:nvPicPr>
+        <p:blipFill>
+          <a:blip r:embed="rId3">
+            <a:extLst>
+              <a:ext uri="{28A0092B-C50C-407E-A947-70E740481C1C}">
+                <a14:useLocalDpi xmlns:a14="http://schemas.microsoft.com/office/drawing/2010/main" val="0"/>
+              </a:ext>
+            </a:extLst>
+          </a:blip>
+          <a:stretch>
+            <a:fillRect/>
+          </a:stretch>
+        </p:blipFill>
+        <p:spPr>
+          <a:xfrm>
+            <a:off x="6218238" y="2211917"/>
+            <a:ext cx="4937125" cy="3291416"/>
+          </a:xfrm>
+        </p:spPr>
+      </p:pic>
+    </p:spTree>
+    <p:extLst>
+      <p:ext uri="{BB962C8B-B14F-4D97-AF65-F5344CB8AC3E}">
+        <p14:creationId xmlns:p14="http://schemas.microsoft.com/office/powerpoint/2010/main" val="2586973295"/>
+      </p:ext>
+    </p:extLst>
+  </p:cSld>
+  <p:clrMapOvr>
+    <a:masterClrMapping/>
+  </p:clrMapOvr>
+</p:sld>
+</file>
+
+<file path=ppt/slides/slide14.xml><?xml version="1.0" encoding="utf-8"?>
+<p:sld xmlns:a="http://schemas.openxmlformats.org/drawingml/2006/main" xmlns:r="http://schemas.openxmlformats.org/officeDocument/2006/relationships" xmlns:p="http://schemas.openxmlformats.org/presentationml/2006/main">
+  <p:cSld>
+    <p:spTree>
+      <p:nvGrpSpPr>
+        <p:cNvPr id="1" name=""/>
+        <p:cNvGrpSpPr/>
+        <p:nvPr/>
+      </p:nvGrpSpPr>
+      <p:grpSpPr>
+        <a:xfrm>
+          <a:off x="0" y="0"/>
+          <a:ext cx="0" cy="0"/>
+          <a:chOff x="0" y="0"/>
+          <a:chExt cx="0" cy="0"/>
+        </a:xfrm>
+      </p:grpSpPr>
+      <p:sp>
+        <p:nvSpPr>
+          <p:cNvPr id="2" name="Title 1">
+            <a:extLst>
+              <a:ext uri="{FF2B5EF4-FFF2-40B4-BE49-F238E27FC236}">
+                <a16:creationId xmlns:a16="http://schemas.microsoft.com/office/drawing/2014/main" id="{1655CE7F-A0ED-3646-A097-AF1AB89C255F}"/>
+              </a:ext>
+            </a:extLst>
+          </p:cNvPr>
+          <p:cNvSpPr>
+            <a:spLocks noGrp="1"/>
+          </p:cNvSpPr>
+          <p:nvPr>
+            <p:ph type="title"/>
+          </p:nvPr>
+        </p:nvSpPr>
+        <p:spPr/>
+        <p:txBody>
+          <a:bodyPr/>
+          <a:lstStyle/>
+          <a:p>
+            <a:r>
+              <a:rPr lang="en-US" b="1" dirty="0"/>
+              <a:t>Play Call Analysis – Pass/Run Ratios</a:t>
+            </a:r>
+          </a:p>
+        </p:txBody>
+      </p:sp>
+      <p:pic>
+        <p:nvPicPr>
+          <p:cNvPr id="7" name="Content Placeholder 6">
+            <a:extLst>
+              <a:ext uri="{FF2B5EF4-FFF2-40B4-BE49-F238E27FC236}">
+                <a16:creationId xmlns:a16="http://schemas.microsoft.com/office/drawing/2014/main" id="{074F0E3D-0102-7345-BCB5-F43898309AB4}"/>
+              </a:ext>
+            </a:extLst>
+          </p:cNvPr>
+          <p:cNvPicPr>
+            <a:picLocks noGrp="1" noChangeAspect="1"/>
+          </p:cNvPicPr>
+          <p:nvPr>
+            <p:ph sz="half" idx="1"/>
+          </p:nvPr>
+        </p:nvPicPr>
+        <p:blipFill>
+          <a:blip r:embed="rId2">
+            <a:extLst>
+              <a:ext uri="{28A0092B-C50C-407E-A947-70E740481C1C}">
+                <a14:useLocalDpi xmlns:a14="http://schemas.microsoft.com/office/drawing/2010/main" val="0"/>
+              </a:ext>
+            </a:extLst>
+          </a:blip>
+          <a:stretch>
+            <a:fillRect/>
+          </a:stretch>
+        </p:blipFill>
+        <p:spPr>
+          <a:xfrm>
+            <a:off x="1096963" y="2211388"/>
+            <a:ext cx="4938712" cy="3292474"/>
+          </a:xfrm>
+        </p:spPr>
+      </p:pic>
+      <p:pic>
+        <p:nvPicPr>
+          <p:cNvPr id="12" name="Content Placeholder 11">
+            <a:extLst>
+              <a:ext uri="{FF2B5EF4-FFF2-40B4-BE49-F238E27FC236}">
+                <a16:creationId xmlns:a16="http://schemas.microsoft.com/office/drawing/2014/main" id="{961A2FD8-2D83-7F49-86CC-0145691E3C74}"/>
+              </a:ext>
+            </a:extLst>
+          </p:cNvPr>
+          <p:cNvPicPr>
+            <a:picLocks noGrp="1" noChangeAspect="1"/>
+          </p:cNvPicPr>
+          <p:nvPr>
+            <p:ph sz="half" idx="2"/>
+          </p:nvPr>
+        </p:nvPicPr>
+        <p:blipFill>
+          <a:blip r:embed="rId3">
+            <a:extLst>
+              <a:ext uri="{28A0092B-C50C-407E-A947-70E740481C1C}">
+                <a14:useLocalDpi xmlns:a14="http://schemas.microsoft.com/office/drawing/2010/main" val="0"/>
+              </a:ext>
+            </a:extLst>
+          </a:blip>
+          <a:stretch>
+            <a:fillRect/>
+          </a:stretch>
+        </p:blipFill>
+        <p:spPr>
+          <a:xfrm>
+            <a:off x="6218238" y="2211917"/>
+            <a:ext cx="4937125" cy="3291416"/>
+          </a:xfrm>
+        </p:spPr>
+      </p:pic>
+    </p:spTree>
+    <p:extLst>
+      <p:ext uri="{BB962C8B-B14F-4D97-AF65-F5344CB8AC3E}">
+        <p14:creationId xmlns:p14="http://schemas.microsoft.com/office/powerpoint/2010/main" val="1894949163"/>
+      </p:ext>
+    </p:extLst>
+  </p:cSld>
+  <p:clrMapOvr>
+    <a:masterClrMapping/>
+  </p:clrMapOvr>
+</p:sld>
+</file>
+
+<file path=ppt/slides/slide15.xml><?xml version="1.0" encoding="utf-8"?>
+<p:sld xmlns:a="http://schemas.openxmlformats.org/drawingml/2006/main" xmlns:r="http://schemas.openxmlformats.org/officeDocument/2006/relationships" xmlns:p="http://schemas.openxmlformats.org/presentationml/2006/main">
+  <p:cSld>
+    <p:spTree>
+      <p:nvGrpSpPr>
+        <p:cNvPr id="1" name=""/>
+        <p:cNvGrpSpPr/>
+        <p:nvPr/>
+      </p:nvGrpSpPr>
+      <p:grpSpPr>
+        <a:xfrm>
+          <a:off x="0" y="0"/>
+          <a:ext cx="0" cy="0"/>
+          <a:chOff x="0" y="0"/>
+          <a:chExt cx="0" cy="0"/>
+        </a:xfrm>
+      </p:grpSpPr>
+      <p:sp>
+        <p:nvSpPr>
+          <p:cNvPr id="2" name="Title 1">
+            <a:extLst>
+              <a:ext uri="{FF2B5EF4-FFF2-40B4-BE49-F238E27FC236}">
+                <a16:creationId xmlns:a16="http://schemas.microsoft.com/office/drawing/2014/main" id="{7C894021-8252-D34D-B74D-7110616A5D33}"/>
+              </a:ext>
+            </a:extLst>
+          </p:cNvPr>
+          <p:cNvSpPr>
+            <a:spLocks noGrp="1"/>
+          </p:cNvSpPr>
+          <p:nvPr>
+            <p:ph type="title"/>
+          </p:nvPr>
+        </p:nvSpPr>
+        <p:spPr/>
+        <p:txBody>
+          <a:bodyPr/>
+          <a:lstStyle/>
+          <a:p>
+            <a:r>
+              <a:rPr lang="en-US" b="1" dirty="0"/>
+              <a:t>Play Call Analysis – Win % vs S&amp;P+</a:t>
+            </a:r>
+          </a:p>
+        </p:txBody>
+      </p:sp>
+      <p:pic>
+        <p:nvPicPr>
+          <p:cNvPr id="10" name="Content Placeholder 9">
+            <a:extLst>
+              <a:ext uri="{FF2B5EF4-FFF2-40B4-BE49-F238E27FC236}">
+                <a16:creationId xmlns:a16="http://schemas.microsoft.com/office/drawing/2014/main" id="{77C44D11-A90D-3E4A-97C7-575440617583}"/>
+              </a:ext>
+            </a:extLst>
+          </p:cNvPr>
+          <p:cNvPicPr>
+            <a:picLocks noGrp="1" noChangeAspect="1"/>
+          </p:cNvPicPr>
+          <p:nvPr>
+            <p:ph sz="half" idx="1"/>
+          </p:nvPr>
+        </p:nvPicPr>
+        <p:blipFill>
+          <a:blip r:embed="rId2">
+            <a:extLst>
+              <a:ext uri="{28A0092B-C50C-407E-A947-70E740481C1C}">
+                <a14:useLocalDpi xmlns:a14="http://schemas.microsoft.com/office/drawing/2010/main" val="0"/>
+              </a:ext>
+            </a:extLst>
+          </a:blip>
+          <a:stretch>
+            <a:fillRect/>
+          </a:stretch>
+        </p:blipFill>
+        <p:spPr>
+          <a:xfrm>
+            <a:off x="1096963" y="2211388"/>
+            <a:ext cx="4938712" cy="3292474"/>
+          </a:xfrm>
+        </p:spPr>
+      </p:pic>
+      <p:pic>
+        <p:nvPicPr>
+          <p:cNvPr id="12" name="Content Placeholder 11">
+            <a:extLst>
+              <a:ext uri="{FF2B5EF4-FFF2-40B4-BE49-F238E27FC236}">
+                <a16:creationId xmlns:a16="http://schemas.microsoft.com/office/drawing/2014/main" id="{BDA815DD-5372-F841-B363-4E236784077E}"/>
+              </a:ext>
+            </a:extLst>
+          </p:cNvPr>
+          <p:cNvPicPr>
+            <a:picLocks noGrp="1" noChangeAspect="1"/>
+          </p:cNvPicPr>
+          <p:nvPr>
+            <p:ph sz="half" idx="2"/>
+          </p:nvPr>
+        </p:nvPicPr>
+        <p:blipFill>
+          <a:blip r:embed="rId3">
+            <a:extLst>
+              <a:ext uri="{28A0092B-C50C-407E-A947-70E740481C1C}">
+                <a14:useLocalDpi xmlns:a14="http://schemas.microsoft.com/office/drawing/2010/main" val="0"/>
+              </a:ext>
+            </a:extLst>
+          </a:blip>
+          <a:stretch>
+            <a:fillRect/>
+          </a:stretch>
+        </p:blipFill>
+        <p:spPr>
+          <a:xfrm>
+            <a:off x="6218238" y="2211917"/>
+            <a:ext cx="4937125" cy="3291416"/>
+          </a:xfrm>
+        </p:spPr>
+      </p:pic>
+    </p:spTree>
+    <p:extLst>
+      <p:ext uri="{BB962C8B-B14F-4D97-AF65-F5344CB8AC3E}">
+        <p14:creationId xmlns:p14="http://schemas.microsoft.com/office/powerpoint/2010/main" val="2279339046"/>
+      </p:ext>
+    </p:extLst>
+  </p:cSld>
+  <p:clrMapOvr>
+    <a:masterClrMapping/>
+  </p:clrMapOvr>
+</p:sld>
+</file>
+
+<file path=ppt/slides/slide16.xml><?xml version="1.0" encoding="utf-8"?>
+<p:sld xmlns:a="http://schemas.openxmlformats.org/drawingml/2006/main" xmlns:r="http://schemas.openxmlformats.org/officeDocument/2006/relationships" xmlns:p="http://schemas.openxmlformats.org/presentationml/2006/main">
+  <p:cSld>
+    <p:spTree>
+      <p:nvGrpSpPr>
+        <p:cNvPr id="1" name=""/>
+        <p:cNvGrpSpPr/>
+        <p:nvPr/>
+      </p:nvGrpSpPr>
+      <p:grpSpPr>
+        <a:xfrm>
+          <a:off x="0" y="0"/>
+          <a:ext cx="0" cy="0"/>
+          <a:chOff x="0" y="0"/>
+          <a:chExt cx="0" cy="0"/>
+        </a:xfrm>
+      </p:grpSpPr>
+      <p:sp>
+        <p:nvSpPr>
+          <p:cNvPr id="2" name="Title 1">
+            <a:extLst>
+              <a:ext uri="{FF2B5EF4-FFF2-40B4-BE49-F238E27FC236}">
+                <a16:creationId xmlns:a16="http://schemas.microsoft.com/office/drawing/2014/main" id="{9A145F65-7BF3-A342-81B4-CFF4CC04CDA6}"/>
+              </a:ext>
+            </a:extLst>
+          </p:cNvPr>
+          <p:cNvSpPr>
+            <a:spLocks noGrp="1"/>
+          </p:cNvSpPr>
+          <p:nvPr>
+            <p:ph type="title"/>
+          </p:nvPr>
+        </p:nvSpPr>
+        <p:spPr/>
+        <p:txBody>
+          <a:bodyPr/>
+          <a:lstStyle/>
+          <a:p>
+            <a:r>
+              <a:rPr lang="en-US" b="1" dirty="0"/>
+              <a:t>Play Call Analysis – Garbage Time Comp</a:t>
+            </a:r>
+          </a:p>
+        </p:txBody>
+      </p:sp>
+      <p:pic>
+        <p:nvPicPr>
+          <p:cNvPr id="6" name="Content Placeholder 5">
+            <a:extLst>
+              <a:ext uri="{FF2B5EF4-FFF2-40B4-BE49-F238E27FC236}">
+                <a16:creationId xmlns:a16="http://schemas.microsoft.com/office/drawing/2014/main" id="{8CDC443A-6772-084F-BCDC-B7E6BA70BEB9}"/>
+              </a:ext>
+            </a:extLst>
+          </p:cNvPr>
+          <p:cNvPicPr>
+            <a:picLocks noGrp="1" noChangeAspect="1"/>
+          </p:cNvPicPr>
+          <p:nvPr>
+            <p:ph sz="half" idx="1"/>
+          </p:nvPr>
+        </p:nvPicPr>
+        <p:blipFill>
+          <a:blip r:embed="rId2">
+            <a:extLst>
+              <a:ext uri="{28A0092B-C50C-407E-A947-70E740481C1C}">
+                <a14:useLocalDpi xmlns:a14="http://schemas.microsoft.com/office/drawing/2010/main" val="0"/>
+              </a:ext>
+            </a:extLst>
+          </a:blip>
+          <a:stretch>
+            <a:fillRect/>
+          </a:stretch>
+        </p:blipFill>
+        <p:spPr>
+          <a:xfrm>
+            <a:off x="1096963" y="2211388"/>
+            <a:ext cx="4938712" cy="3292474"/>
+          </a:xfrm>
+        </p:spPr>
+      </p:pic>
+      <p:pic>
+        <p:nvPicPr>
+          <p:cNvPr id="8" name="Content Placeholder 7">
+            <a:extLst>
+              <a:ext uri="{FF2B5EF4-FFF2-40B4-BE49-F238E27FC236}">
+                <a16:creationId xmlns:a16="http://schemas.microsoft.com/office/drawing/2014/main" id="{3E9EFA01-EDD3-4447-80BE-4DDD6487BC4A}"/>
+              </a:ext>
+            </a:extLst>
+          </p:cNvPr>
+          <p:cNvPicPr>
+            <a:picLocks noGrp="1" noChangeAspect="1"/>
+          </p:cNvPicPr>
+          <p:nvPr>
+            <p:ph sz="half" idx="2"/>
+          </p:nvPr>
+        </p:nvPicPr>
+        <p:blipFill>
+          <a:blip r:embed="rId3">
+            <a:extLst>
+              <a:ext uri="{28A0092B-C50C-407E-A947-70E740481C1C}">
+                <a14:useLocalDpi xmlns:a14="http://schemas.microsoft.com/office/drawing/2010/main" val="0"/>
+              </a:ext>
+            </a:extLst>
+          </a:blip>
+          <a:stretch>
+            <a:fillRect/>
+          </a:stretch>
+        </p:blipFill>
+        <p:spPr>
+          <a:xfrm>
+            <a:off x="6218238" y="2211917"/>
+            <a:ext cx="4937125" cy="3291416"/>
+          </a:xfrm>
+        </p:spPr>
+      </p:pic>
+    </p:spTree>
+    <p:extLst>
+      <p:ext uri="{BB962C8B-B14F-4D97-AF65-F5344CB8AC3E}">
+        <p14:creationId xmlns:p14="http://schemas.microsoft.com/office/powerpoint/2010/main" val="1272310999"/>
+      </p:ext>
+    </p:extLst>
+  </p:cSld>
+  <p:clrMapOvr>
+    <a:masterClrMapping/>
+  </p:clrMapOvr>
+</p:sld>
+</file>
+
+<file path=ppt/slides/slide17.xml><?xml version="1.0" encoding="utf-8"?>
+<p:sld xmlns:a="http://schemas.openxmlformats.org/drawingml/2006/main" xmlns:r="http://schemas.openxmlformats.org/officeDocument/2006/relationships" xmlns:p="http://schemas.openxmlformats.org/presentationml/2006/main">
+  <p:cSld>
+    <p:spTree>
+      <p:nvGrpSpPr>
+        <p:cNvPr id="1" name=""/>
+        <p:cNvGrpSpPr/>
+        <p:nvPr/>
+      </p:nvGrpSpPr>
+      <p:grpSpPr>
+        <a:xfrm>
+          <a:off x="0" y="0"/>
+          <a:ext cx="0" cy="0"/>
+          <a:chOff x="0" y="0"/>
+          <a:chExt cx="0" cy="0"/>
+        </a:xfrm>
+      </p:grpSpPr>
+      <p:sp>
+        <p:nvSpPr>
+          <p:cNvPr id="2" name="Title 1">
+            <a:extLst>
+              <a:ext uri="{FF2B5EF4-FFF2-40B4-BE49-F238E27FC236}">
+                <a16:creationId xmlns:a16="http://schemas.microsoft.com/office/drawing/2014/main" id="{77D861E6-C13D-C34E-8665-BCCA06A9EB2E}"/>
+              </a:ext>
+            </a:extLst>
+          </p:cNvPr>
+          <p:cNvSpPr>
+            <a:spLocks noGrp="1"/>
+          </p:cNvSpPr>
+          <p:nvPr>
+            <p:ph type="title"/>
+          </p:nvPr>
+        </p:nvSpPr>
+        <p:spPr/>
+        <p:txBody>
+          <a:bodyPr/>
+          <a:lstStyle/>
+          <a:p>
+            <a:r>
+              <a:rPr lang="en-US" b="1" dirty="0"/>
+              <a:t>Play Call Analysis – S&amp;P Rating Comp</a:t>
+            </a:r>
+            <a:endParaRPr lang="en-US" dirty="0"/>
+          </a:p>
+        </p:txBody>
+      </p:sp>
+      <p:pic>
+        <p:nvPicPr>
+          <p:cNvPr id="6" name="Content Placeholder 5">
+            <a:extLst>
+              <a:ext uri="{FF2B5EF4-FFF2-40B4-BE49-F238E27FC236}">
+                <a16:creationId xmlns:a16="http://schemas.microsoft.com/office/drawing/2014/main" id="{4BE1AF28-6495-154E-9B05-6C78CE675A7F}"/>
+              </a:ext>
+            </a:extLst>
+          </p:cNvPr>
+          <p:cNvPicPr>
+            <a:picLocks noGrp="1" noChangeAspect="1"/>
+          </p:cNvPicPr>
+          <p:nvPr>
+            <p:ph sz="half" idx="1"/>
+          </p:nvPr>
+        </p:nvPicPr>
+        <p:blipFill>
+          <a:blip r:embed="rId2">
+            <a:extLst>
+              <a:ext uri="{28A0092B-C50C-407E-A947-70E740481C1C}">
+                <a14:useLocalDpi xmlns:a14="http://schemas.microsoft.com/office/drawing/2010/main" val="0"/>
+              </a:ext>
+            </a:extLst>
+          </a:blip>
+          <a:stretch>
+            <a:fillRect/>
+          </a:stretch>
+        </p:blipFill>
+        <p:spPr>
+          <a:xfrm>
+            <a:off x="1096963" y="2211388"/>
+            <a:ext cx="4938712" cy="3292474"/>
+          </a:xfrm>
+        </p:spPr>
+      </p:pic>
+      <p:pic>
+        <p:nvPicPr>
+          <p:cNvPr id="8" name="Content Placeholder 7">
+            <a:extLst>
+              <a:ext uri="{FF2B5EF4-FFF2-40B4-BE49-F238E27FC236}">
+                <a16:creationId xmlns:a16="http://schemas.microsoft.com/office/drawing/2014/main" id="{74F150C5-A4EA-B142-BBD3-71F4CB8C1A10}"/>
+              </a:ext>
+            </a:extLst>
+          </p:cNvPr>
+          <p:cNvPicPr>
+            <a:picLocks noGrp="1" noChangeAspect="1"/>
+          </p:cNvPicPr>
+          <p:nvPr>
+            <p:ph sz="half" idx="2"/>
+          </p:nvPr>
+        </p:nvPicPr>
+        <p:blipFill>
+          <a:blip r:embed="rId3">
+            <a:extLst>
+              <a:ext uri="{28A0092B-C50C-407E-A947-70E740481C1C}">
+                <a14:useLocalDpi xmlns:a14="http://schemas.microsoft.com/office/drawing/2010/main" val="0"/>
+              </a:ext>
+            </a:extLst>
+          </a:blip>
+          <a:stretch>
+            <a:fillRect/>
+          </a:stretch>
+        </p:blipFill>
+        <p:spPr>
+          <a:xfrm>
+            <a:off x="6218238" y="2211917"/>
+            <a:ext cx="4937125" cy="3291416"/>
+          </a:xfrm>
+        </p:spPr>
+      </p:pic>
+    </p:spTree>
+    <p:extLst>
+      <p:ext uri="{BB962C8B-B14F-4D97-AF65-F5344CB8AC3E}">
+        <p14:creationId xmlns:p14="http://schemas.microsoft.com/office/powerpoint/2010/main" val="2521867888"/>
+      </p:ext>
+    </p:extLst>
+  </p:cSld>
+  <p:clrMapOvr>
+    <a:masterClrMapping/>
+  </p:clrMapOvr>
+</p:sld>
+</file>
+
+<file path=ppt/slides/slide18.xml><?xml version="1.0" encoding="utf-8"?>
+<p:sld xmlns:a="http://schemas.openxmlformats.org/drawingml/2006/main" xmlns:r="http://schemas.openxmlformats.org/officeDocument/2006/relationships" xmlns:p="http://schemas.openxmlformats.org/presentationml/2006/main">
+  <p:cSld>
+    <p:spTree>
+      <p:nvGrpSpPr>
+        <p:cNvPr id="1" name=""/>
+        <p:cNvGrpSpPr/>
+        <p:nvPr/>
+      </p:nvGrpSpPr>
+      <p:grpSpPr>
+        <a:xfrm>
+          <a:off x="0" y="0"/>
+          <a:ext cx="0" cy="0"/>
+          <a:chOff x="0" y="0"/>
+          <a:chExt cx="0" cy="0"/>
+        </a:xfrm>
+      </p:grpSpPr>
+      <p:sp>
+        <p:nvSpPr>
           <p:cNvPr id="2" name="Title 1">
             <a:extLst>
               <a:ext uri="{FF2B5EF4-FFF2-40B4-BE49-F238E27FC236}">
@@ -4293,7 +4939,7 @@
             </a:pPr>
             <a:r>
               <a:rPr lang="en-US" dirty="0"/>
-              <a:t>R-Squared Value: </a:t>
+              <a:t>R-Squared Values: -0.24</a:t>
             </a:r>
           </a:p>
           <a:p>
@@ -4323,7 +4969,7 @@
             </a:pPr>
             <a:r>
               <a:rPr lang="en-US" dirty="0"/>
-              <a:t>R-Squared Value: </a:t>
+              <a:t>R-Squared Value: -0.18</a:t>
             </a:r>
           </a:p>
           <a:p>
@@ -4353,7 +4999,7 @@
             </a:pPr>
             <a:r>
               <a:rPr lang="en-US" dirty="0"/>
-              <a:t>R-Squared Value: </a:t>
+              <a:t>R-Squared Value: -0.13</a:t>
             </a:r>
           </a:p>
         </p:txBody>
@@ -4371,7 +5017,7 @@
 </p:sld>
 </file>
 
-<file path=ppt/slides/slide14.xml><?xml version="1.0" encoding="utf-8"?>
+<file path=ppt/slides/slide19.xml><?xml version="1.0" encoding="utf-8"?>
 <p:sld xmlns:a="http://schemas.openxmlformats.org/drawingml/2006/main" xmlns:r="http://schemas.openxmlformats.org/officeDocument/2006/relationships" xmlns:p="http://schemas.openxmlformats.org/presentationml/2006/main">
   <p:cSld>
     <p:spTree>

</xml_diff>

<commit_message>
update figures and powerpoint
</commit_message>
<xml_diff>
--- a/CFBPresentation.pptx
+++ b/CFBPresentation.pptx
@@ -13,17 +13,18 @@
     <p:sldId id="264" r:id="rId7"/>
     <p:sldId id="265" r:id="rId8"/>
     <p:sldId id="266" r:id="rId9"/>
-    <p:sldId id="267" r:id="rId10"/>
-    <p:sldId id="268" r:id="rId11"/>
-    <p:sldId id="269" r:id="rId12"/>
-    <p:sldId id="260" r:id="rId13"/>
-    <p:sldId id="270" r:id="rId14"/>
-    <p:sldId id="272" r:id="rId15"/>
-    <p:sldId id="271" r:id="rId16"/>
-    <p:sldId id="273" r:id="rId17"/>
-    <p:sldId id="274" r:id="rId18"/>
-    <p:sldId id="261" r:id="rId19"/>
-    <p:sldId id="262" r:id="rId20"/>
+    <p:sldId id="275" r:id="rId10"/>
+    <p:sldId id="267" r:id="rId11"/>
+    <p:sldId id="268" r:id="rId12"/>
+    <p:sldId id="269" r:id="rId13"/>
+    <p:sldId id="260" r:id="rId14"/>
+    <p:sldId id="270" r:id="rId15"/>
+    <p:sldId id="272" r:id="rId16"/>
+    <p:sldId id="271" r:id="rId17"/>
+    <p:sldId id="273" r:id="rId18"/>
+    <p:sldId id="274" r:id="rId19"/>
+    <p:sldId id="261" r:id="rId20"/>
+    <p:sldId id="262" r:id="rId21"/>
   </p:sldIdLst>
   <p:sldSz cx="12192000" cy="6858000"/>
   <p:notesSz cx="6858000" cy="9144000"/>
@@ -364,7 +365,7 @@
           <a:p>
             <a:fld id="{2306057D-A193-4CDB-AD4E-0222AF2C9990}" type="datetimeFigureOut">
               <a:rPr lang="en-US" smtClean="0"/>
-              <a:t>1/16/20</a:t>
+              <a:t>1/16/2020</a:t>
             </a:fld>
             <a:endParaRPr lang="en-US"/>
           </a:p>
@@ -572,7 +573,7 @@
           <a:p>
             <a:fld id="{2306057D-A193-4CDB-AD4E-0222AF2C9990}" type="datetimeFigureOut">
               <a:rPr lang="en-US" smtClean="0"/>
-              <a:t>1/16/20</a:t>
+              <a:t>1/16/2020</a:t>
             </a:fld>
             <a:endParaRPr lang="en-US"/>
           </a:p>
@@ -828,7 +829,7 @@
           <a:p>
             <a:fld id="{2306057D-A193-4CDB-AD4E-0222AF2C9990}" type="datetimeFigureOut">
               <a:rPr lang="en-US" smtClean="0"/>
-              <a:t>1/16/20</a:t>
+              <a:t>1/16/2020</a:t>
             </a:fld>
             <a:endParaRPr lang="en-US"/>
           </a:p>
@@ -998,7 +999,7 @@
           <a:p>
             <a:fld id="{2306057D-A193-4CDB-AD4E-0222AF2C9990}" type="datetimeFigureOut">
               <a:rPr lang="en-US" smtClean="0"/>
-              <a:t>1/16/20</a:t>
+              <a:t>1/16/2020</a:t>
             </a:fld>
             <a:endParaRPr lang="en-US"/>
           </a:p>
@@ -1333,7 +1334,7 @@
           <a:p>
             <a:fld id="{2306057D-A193-4CDB-AD4E-0222AF2C9990}" type="datetimeFigureOut">
               <a:rPr lang="en-US" smtClean="0"/>
-              <a:t>1/16/20</a:t>
+              <a:t>1/16/2020</a:t>
             </a:fld>
             <a:endParaRPr lang="en-US"/>
           </a:p>
@@ -1608,7 +1609,7 @@
           <a:p>
             <a:fld id="{2306057D-A193-4CDB-AD4E-0222AF2C9990}" type="datetimeFigureOut">
               <a:rPr lang="en-US" smtClean="0"/>
-              <a:t>1/16/20</a:t>
+              <a:t>1/16/2020</a:t>
             </a:fld>
             <a:endParaRPr lang="en-US"/>
           </a:p>
@@ -1987,7 +1988,7 @@
           <a:p>
             <a:fld id="{2306057D-A193-4CDB-AD4E-0222AF2C9990}" type="datetimeFigureOut">
               <a:rPr lang="en-US" smtClean="0"/>
-              <a:t>1/16/20</a:t>
+              <a:t>1/16/2020</a:t>
             </a:fld>
             <a:endParaRPr lang="en-US"/>
           </a:p>
@@ -2105,7 +2106,7 @@
           <a:p>
             <a:fld id="{2306057D-A193-4CDB-AD4E-0222AF2C9990}" type="datetimeFigureOut">
               <a:rPr lang="en-US" smtClean="0"/>
-              <a:t>1/16/20</a:t>
+              <a:t>1/16/2020</a:t>
             </a:fld>
             <a:endParaRPr lang="en-US"/>
           </a:p>
@@ -2276,7 +2277,7 @@
           <a:p>
             <a:fld id="{2306057D-A193-4CDB-AD4E-0222AF2C9990}" type="datetimeFigureOut">
               <a:rPr lang="en-US" smtClean="0"/>
-              <a:t>1/16/20</a:t>
+              <a:t>1/16/2020</a:t>
             </a:fld>
             <a:endParaRPr lang="en-US"/>
           </a:p>
@@ -2630,7 +2631,7 @@
           <a:p>
             <a:fld id="{2306057D-A193-4CDB-AD4E-0222AF2C9990}" type="datetimeFigureOut">
               <a:rPr lang="en-US" smtClean="0"/>
-              <a:t>1/16/20</a:t>
+              <a:t>1/16/2020</a:t>
             </a:fld>
             <a:endParaRPr lang="en-US"/>
           </a:p>
@@ -3007,7 +3008,7 @@
           <a:p>
             <a:fld id="{2306057D-A193-4CDB-AD4E-0222AF2C9990}" type="datetimeFigureOut">
               <a:rPr lang="en-US" smtClean="0"/>
-              <a:t>1/16/20</a:t>
+              <a:t>1/16/2020</a:t>
             </a:fld>
             <a:endParaRPr lang="en-US"/>
           </a:p>
@@ -3294,7 +3295,7 @@
           <a:p>
             <a:fld id="{2306057D-A193-4CDB-AD4E-0222AF2C9990}" type="datetimeFigureOut">
               <a:rPr lang="en-US" smtClean="0"/>
-              <a:t>1/16/20</a:t>
+              <a:t>1/16/2020</a:t>
             </a:fld>
             <a:endParaRPr lang="en-US"/>
           </a:p>
@@ -3926,10 +3927,76 @@
       </p:grpSpPr>
       <p:pic>
         <p:nvPicPr>
-          <p:cNvPr id="3" name="Picture 2" descr="A picture containing air, various, different, bunch&#10;&#10;Description automatically generated">
+          <p:cNvPr id="4" name="Picture 3" descr="A close up of a map&#10;&#10;Description automatically generated">
             <a:extLst>
               <a:ext uri="{FF2B5EF4-FFF2-40B4-BE49-F238E27FC236}">
-                <a16:creationId xmlns:a16="http://schemas.microsoft.com/office/drawing/2014/main" id="{DFBB479C-F266-434C-9EB0-7C128434C92E}"/>
+                <a16:creationId xmlns:a16="http://schemas.microsoft.com/office/drawing/2014/main" id="{3C9FCF45-09DB-45BA-B578-C4F00094B293}"/>
+              </a:ext>
+            </a:extLst>
+          </p:cNvPr>
+          <p:cNvPicPr>
+            <a:picLocks noChangeAspect="1"/>
+          </p:cNvPicPr>
+          <p:nvPr/>
+        </p:nvPicPr>
+        <p:blipFill>
+          <a:blip r:embed="rId2">
+            <a:extLst>
+              <a:ext uri="{28A0092B-C50C-407E-A947-70E740481C1C}">
+                <a14:useLocalDpi xmlns:a14="http://schemas.microsoft.com/office/drawing/2010/main" val="0"/>
+              </a:ext>
+            </a:extLst>
+          </a:blip>
+          <a:stretch>
+            <a:fillRect/>
+          </a:stretch>
+        </p:blipFill>
+        <p:spPr>
+          <a:xfrm>
+            <a:off x="0" y="381000"/>
+            <a:ext cx="12192000" cy="6096000"/>
+          </a:xfrm>
+          <a:prstGeom prst="rect">
+            <a:avLst/>
+          </a:prstGeom>
+        </p:spPr>
+      </p:pic>
+    </p:spTree>
+    <p:extLst>
+      <p:ext uri="{BB962C8B-B14F-4D97-AF65-F5344CB8AC3E}">
+        <p14:creationId xmlns:p14="http://schemas.microsoft.com/office/powerpoint/2010/main" val="1597046657"/>
+      </p:ext>
+    </p:extLst>
+  </p:cSld>
+  <p:clrMapOvr>
+    <a:masterClrMapping/>
+  </p:clrMapOvr>
+</p:sld>
+</file>
+
+<file path=ppt/slides/slide11.xml><?xml version="1.0" encoding="utf-8"?>
+<p:sld xmlns:a="http://schemas.openxmlformats.org/drawingml/2006/main" xmlns:r="http://schemas.openxmlformats.org/officeDocument/2006/relationships" xmlns:p="http://schemas.openxmlformats.org/presentationml/2006/main">
+  <p:cSld>
+    <p:spTree>
+      <p:nvGrpSpPr>
+        <p:cNvPr id="1" name=""/>
+        <p:cNvGrpSpPr/>
+        <p:nvPr/>
+      </p:nvGrpSpPr>
+      <p:grpSpPr>
+        <a:xfrm>
+          <a:off x="0" y="0"/>
+          <a:ext cx="0" cy="0"/>
+          <a:chOff x="0" y="0"/>
+          <a:chExt cx="0" cy="0"/>
+        </a:xfrm>
+      </p:grpSpPr>
+      <p:pic>
+        <p:nvPicPr>
+          <p:cNvPr id="4" name="Picture 3" descr="A picture containing table, different, man, various&#10;&#10;Description automatically generated">
+            <a:extLst>
+              <a:ext uri="{FF2B5EF4-FFF2-40B4-BE49-F238E27FC236}">
+                <a16:creationId xmlns:a16="http://schemas.microsoft.com/office/drawing/2014/main" id="{FB2AAFD9-CBE6-4B9E-AA14-2DC735339852}"/>
               </a:ext>
             </a:extLst>
           </p:cNvPr>
@@ -3973,7 +4040,7 @@
 </p:sld>
 </file>
 
-<file path=ppt/slides/slide11.xml><?xml version="1.0" encoding="utf-8"?>
+<file path=ppt/slides/slide12.xml><?xml version="1.0" encoding="utf-8"?>
 <p:sld xmlns:a="http://schemas.openxmlformats.org/drawingml/2006/main" xmlns:r="http://schemas.openxmlformats.org/officeDocument/2006/relationships" xmlns:p="http://schemas.openxmlformats.org/presentationml/2006/main">
   <p:cSld>
     <p:spTree>
@@ -3992,10 +4059,10 @@
       </p:grpSpPr>
       <p:pic>
         <p:nvPicPr>
-          <p:cNvPr id="3" name="Picture 2" descr="A close up of a map&#10;&#10;Description automatically generated">
+          <p:cNvPr id="4" name="Picture 3" descr="A close up of a map&#10;&#10;Description automatically generated">
             <a:extLst>
               <a:ext uri="{FF2B5EF4-FFF2-40B4-BE49-F238E27FC236}">
-                <a16:creationId xmlns:a16="http://schemas.microsoft.com/office/drawing/2014/main" id="{35855E13-D331-443A-8500-BC185875F2D5}"/>
+                <a16:creationId xmlns:a16="http://schemas.microsoft.com/office/drawing/2014/main" id="{9591F98C-2BBE-40D1-8DE0-B785217F79A9}"/>
               </a:ext>
             </a:extLst>
           </p:cNvPr>
@@ -4039,7 +4106,7 @@
 </p:sld>
 </file>
 
-<file path=ppt/slides/slide12.xml><?xml version="1.0" encoding="utf-8"?>
+<file path=ppt/slides/slide13.xml><?xml version="1.0" encoding="utf-8"?>
 <p:sld xmlns:a="http://schemas.openxmlformats.org/drawingml/2006/main" xmlns:r="http://schemas.openxmlformats.org/officeDocument/2006/relationships" xmlns:p="http://schemas.openxmlformats.org/presentationml/2006/main">
   <p:cSld>
     <p:spTree>
@@ -4206,7 +4273,7 @@
 </p:sld>
 </file>
 
-<file path=ppt/slides/slide13.xml><?xml version="1.0" encoding="utf-8"?>
+<file path=ppt/slides/slide14.xml><?xml version="1.0" encoding="utf-8"?>
 <p:sld xmlns:a="http://schemas.openxmlformats.org/drawingml/2006/main" xmlns:r="http://schemas.openxmlformats.org/officeDocument/2006/relationships" xmlns:p="http://schemas.openxmlformats.org/presentationml/2006/main">
   <p:cSld>
     <p:spTree>
@@ -4334,7 +4401,7 @@
 </p:sld>
 </file>
 
-<file path=ppt/slides/slide14.xml><?xml version="1.0" encoding="utf-8"?>
+<file path=ppt/slides/slide15.xml><?xml version="1.0" encoding="utf-8"?>
 <p:sld xmlns:a="http://schemas.openxmlformats.org/drawingml/2006/main" xmlns:r="http://schemas.openxmlformats.org/officeDocument/2006/relationships" xmlns:p="http://schemas.openxmlformats.org/presentationml/2006/main">
   <p:cSld>
     <p:spTree>
@@ -4462,7 +4529,7 @@
 </p:sld>
 </file>
 
-<file path=ppt/slides/slide15.xml><?xml version="1.0" encoding="utf-8"?>
+<file path=ppt/slides/slide16.xml><?xml version="1.0" encoding="utf-8"?>
 <p:sld xmlns:a="http://schemas.openxmlformats.org/drawingml/2006/main" xmlns:r="http://schemas.openxmlformats.org/officeDocument/2006/relationships" xmlns:p="http://schemas.openxmlformats.org/presentationml/2006/main">
   <p:cSld>
     <p:spTree>
@@ -4590,7 +4657,7 @@
 </p:sld>
 </file>
 
-<file path=ppt/slides/slide16.xml><?xml version="1.0" encoding="utf-8"?>
+<file path=ppt/slides/slide17.xml><?xml version="1.0" encoding="utf-8"?>
 <p:sld xmlns:a="http://schemas.openxmlformats.org/drawingml/2006/main" xmlns:r="http://schemas.openxmlformats.org/officeDocument/2006/relationships" xmlns:p="http://schemas.openxmlformats.org/presentationml/2006/main">
   <p:cSld>
     <p:spTree>
@@ -4718,7 +4785,7 @@
 </p:sld>
 </file>
 
-<file path=ppt/slides/slide17.xml><?xml version="1.0" encoding="utf-8"?>
+<file path=ppt/slides/slide18.xml><?xml version="1.0" encoding="utf-8"?>
 <p:sld xmlns:a="http://schemas.openxmlformats.org/drawingml/2006/main" xmlns:r="http://schemas.openxmlformats.org/officeDocument/2006/relationships" xmlns:p="http://schemas.openxmlformats.org/presentationml/2006/main">
   <p:cSld>
     <p:spTree>
@@ -4847,176 +4914,6 @@
 </p:sld>
 </file>
 
-<file path=ppt/slides/slide18.xml><?xml version="1.0" encoding="utf-8"?>
-<p:sld xmlns:a="http://schemas.openxmlformats.org/drawingml/2006/main" xmlns:r="http://schemas.openxmlformats.org/officeDocument/2006/relationships" xmlns:p="http://schemas.openxmlformats.org/presentationml/2006/main">
-  <p:cSld>
-    <p:spTree>
-      <p:nvGrpSpPr>
-        <p:cNvPr id="1" name=""/>
-        <p:cNvGrpSpPr/>
-        <p:nvPr/>
-      </p:nvGrpSpPr>
-      <p:grpSpPr>
-        <a:xfrm>
-          <a:off x="0" y="0"/>
-          <a:ext cx="0" cy="0"/>
-          <a:chOff x="0" y="0"/>
-          <a:chExt cx="0" cy="0"/>
-        </a:xfrm>
-      </p:grpSpPr>
-      <p:sp>
-        <p:nvSpPr>
-          <p:cNvPr id="2" name="Title 1">
-            <a:extLst>
-              <a:ext uri="{FF2B5EF4-FFF2-40B4-BE49-F238E27FC236}">
-                <a16:creationId xmlns:a16="http://schemas.microsoft.com/office/drawing/2014/main" id="{AC0CBCD7-D872-4770-A58E-19C6B41D679F}"/>
-              </a:ext>
-            </a:extLst>
-          </p:cNvPr>
-          <p:cNvSpPr>
-            <a:spLocks noGrp="1"/>
-          </p:cNvSpPr>
-          <p:nvPr>
-            <p:ph type="title"/>
-          </p:nvPr>
-        </p:nvSpPr>
-        <p:spPr/>
-        <p:txBody>
-          <a:bodyPr/>
-          <a:lstStyle/>
-          <a:p>
-            <a:r>
-              <a:rPr lang="en-US" b="1" dirty="0"/>
-              <a:t>Play Call Analysis Findings</a:t>
-            </a:r>
-          </a:p>
-        </p:txBody>
-      </p:sp>
-      <p:sp>
-        <p:nvSpPr>
-          <p:cNvPr id="3" name="Content Placeholder 2">
-            <a:extLst>
-              <a:ext uri="{FF2B5EF4-FFF2-40B4-BE49-F238E27FC236}">
-                <a16:creationId xmlns:a16="http://schemas.microsoft.com/office/drawing/2014/main" id="{02FB5492-062C-41EB-A0B7-7AF02531117C}"/>
-              </a:ext>
-            </a:extLst>
-          </p:cNvPr>
-          <p:cNvSpPr>
-            <a:spLocks noGrp="1"/>
-          </p:cNvSpPr>
-          <p:nvPr>
-            <p:ph idx="1"/>
-          </p:nvPr>
-        </p:nvSpPr>
-        <p:spPr/>
-        <p:txBody>
-          <a:bodyPr/>
-          <a:lstStyle/>
-          <a:p>
-            <a:pPr fontAlgn="base">
-              <a:buFont typeface="Wingdings" panose="05000000000000000000" pitchFamily="2" charset="2"/>
-              <a:buChar char="§"/>
-            </a:pPr>
-            <a:r>
-              <a:rPr lang="en-US" dirty="0"/>
-              <a:t>First Pass: Pass-Run Ratio vs Win %</a:t>
-            </a:r>
-          </a:p>
-          <a:p>
-            <a:pPr lvl="1" fontAlgn="base">
-              <a:buFont typeface="Arial" panose="020B0604020202020204" pitchFamily="34" charset="0"/>
-              <a:buChar char="•"/>
-            </a:pPr>
-            <a:r>
-              <a:rPr lang="en-US" dirty="0"/>
-              <a:t>No correlation between passes per run and win rate</a:t>
-            </a:r>
-          </a:p>
-          <a:p>
-            <a:pPr lvl="1" fontAlgn="base">
-              <a:buFont typeface="Arial" panose="020B0604020202020204" pitchFamily="34" charset="0"/>
-              <a:buChar char="•"/>
-            </a:pPr>
-            <a:r>
-              <a:rPr lang="en-US" dirty="0"/>
-              <a:t>R-Squared Values: -0.24</a:t>
-            </a:r>
-          </a:p>
-          <a:p>
-            <a:pPr fontAlgn="base">
-              <a:buFont typeface="Wingdings" panose="05000000000000000000" pitchFamily="2" charset="2"/>
-              <a:buChar char="§"/>
-            </a:pPr>
-            <a:r>
-              <a:rPr lang="en-US" dirty="0"/>
-              <a:t>Second Pass: Removing garbage time data</a:t>
-            </a:r>
-          </a:p>
-          <a:p>
-            <a:pPr lvl="1" fontAlgn="base">
-              <a:buFont typeface="Arial" panose="020B0604020202020204" pitchFamily="34" charset="0"/>
-              <a:buChar char="•"/>
-            </a:pPr>
-            <a:r>
-              <a:rPr lang="en-US" dirty="0"/>
-              <a:t>No correlation between passes per run (in competitive situations) and win rate</a:t>
-            </a:r>
-          </a:p>
-          <a:p>
-            <a:pPr lvl="1" fontAlgn="base">
-              <a:buFont typeface="Arial" panose="020B0604020202020204" pitchFamily="34" charset="0"/>
-              <a:buChar char="•"/>
-            </a:pPr>
-            <a:r>
-              <a:rPr lang="en-US" dirty="0"/>
-              <a:t>R-Squared Value: -0.18</a:t>
-            </a:r>
-          </a:p>
-          <a:p>
-            <a:pPr fontAlgn="base">
-              <a:buFont typeface="Wingdings" panose="05000000000000000000" pitchFamily="2" charset="2"/>
-              <a:buChar char="§"/>
-            </a:pPr>
-            <a:r>
-              <a:rPr lang="en-US" dirty="0"/>
-              <a:t>Third Pass: Comparison to S&amp;P+ Rating</a:t>
-            </a:r>
-          </a:p>
-          <a:p>
-            <a:pPr lvl="1" fontAlgn="base">
-              <a:buFont typeface="Arial" panose="020B0604020202020204" pitchFamily="34" charset="0"/>
-              <a:buChar char="•"/>
-            </a:pPr>
-            <a:r>
-              <a:rPr lang="en-US" dirty="0"/>
-              <a:t>No correlation between passes per run (in competitive situations) and win rate</a:t>
-            </a:r>
-          </a:p>
-          <a:p>
-            <a:pPr lvl="1" fontAlgn="base">
-              <a:buFont typeface="Arial" panose="020B0604020202020204" pitchFamily="34" charset="0"/>
-              <a:buChar char="•"/>
-            </a:pPr>
-            <a:r>
-              <a:rPr lang="en-US" dirty="0"/>
-              <a:t>R-Squared Value: -0.13</a:t>
-            </a:r>
-          </a:p>
-        </p:txBody>
-      </p:sp>
-    </p:spTree>
-    <p:extLst>
-      <p:ext uri="{BB962C8B-B14F-4D97-AF65-F5344CB8AC3E}">
-        <p14:creationId xmlns:p14="http://schemas.microsoft.com/office/powerpoint/2010/main" val="2780420744"/>
-      </p:ext>
-    </p:extLst>
-  </p:cSld>
-  <p:clrMapOvr>
-    <a:masterClrMapping/>
-  </p:clrMapOvr>
-</p:sld>
-</file>
-
 <file path=ppt/slides/slide19.xml><?xml version="1.0" encoding="utf-8"?>
 <p:sld xmlns:a="http://schemas.openxmlformats.org/drawingml/2006/main" xmlns:r="http://schemas.openxmlformats.org/officeDocument/2006/relationships" xmlns:p="http://schemas.openxmlformats.org/presentationml/2006/main">
   <p:cSld>
@@ -5039,7 +4936,7 @@
           <p:cNvPr id="2" name="Title 1">
             <a:extLst>
               <a:ext uri="{FF2B5EF4-FFF2-40B4-BE49-F238E27FC236}">
-                <a16:creationId xmlns:a16="http://schemas.microsoft.com/office/drawing/2014/main" id="{250023F7-5D99-4925-A6A8-DE7183EF5DC3}"/>
+                <a16:creationId xmlns:a16="http://schemas.microsoft.com/office/drawing/2014/main" id="{AC0CBCD7-D872-4770-A58E-19C6B41D679F}"/>
               </a:ext>
             </a:extLst>
           </p:cNvPr>
@@ -5056,12 +4953,8 @@
           <a:lstStyle/>
           <a:p>
             <a:r>
-              <a:rPr lang="en-US" b="1"/>
-              <a:t>Further </a:t>
-            </a:r>
-            <a:r>
               <a:rPr lang="en-US" b="1" dirty="0"/>
-              <a:t>Questions</a:t>
+              <a:t>Play Call Analysis Findings</a:t>
             </a:r>
           </a:p>
         </p:txBody>
@@ -5071,7 +4964,7 @@
           <p:cNvPr id="3" name="Content Placeholder 2">
             <a:extLst>
               <a:ext uri="{FF2B5EF4-FFF2-40B4-BE49-F238E27FC236}">
-                <a16:creationId xmlns:a16="http://schemas.microsoft.com/office/drawing/2014/main" id="{FC5ECB44-71F2-4928-AA01-11D3CC942685}"/>
+                <a16:creationId xmlns:a16="http://schemas.microsoft.com/office/drawing/2014/main" id="{02FB5492-062C-41EB-A0B7-7AF02531117C}"/>
               </a:ext>
             </a:extLst>
           </p:cNvPr>
@@ -5087,12 +4980,13 @@
           <a:bodyPr/>
           <a:lstStyle/>
           <a:p>
-            <a:pPr marL="0" indent="0" fontAlgn="base">
-              <a:buNone/>
+            <a:pPr fontAlgn="base">
+              <a:buFont typeface="Wingdings" panose="05000000000000000000" pitchFamily="2" charset="2"/>
+              <a:buChar char="§"/>
             </a:pPr>
             <a:r>
               <a:rPr lang="en-US" dirty="0"/>
-              <a:t>Could this data be better explored by doing a series of case studies on schools that might show variances in these data in the same team?</a:t>
+              <a:t>First Pass: Pass-Run Ratio vs Win %</a:t>
             </a:r>
           </a:p>
           <a:p>
@@ -5102,16 +4996,7 @@
             </a:pPr>
             <a:r>
               <a:rPr lang="en-US" dirty="0"/>
-              <a:t>For example: Clemson or Alabama</a:t>
-            </a:r>
-          </a:p>
-          <a:p>
-            <a:pPr marL="0" indent="0" fontAlgn="base">
-              <a:buNone/>
-            </a:pPr>
-            <a:r>
-              <a:rPr lang="en-US" dirty="0"/>
-              <a:t>Are there other predictive measures that have a better correlation to our success outcomes?</a:t>
+              <a:t>No correlation between passes per run and win rate</a:t>
             </a:r>
           </a:p>
           <a:p>
@@ -5121,7 +5006,17 @@
             </a:pPr>
             <a:r>
               <a:rPr lang="en-US" dirty="0"/>
-              <a:t>Turnovers</a:t>
+              <a:t>R-Squared Values: -0.24</a:t>
+            </a:r>
+          </a:p>
+          <a:p>
+            <a:pPr fontAlgn="base">
+              <a:buFont typeface="Wingdings" panose="05000000000000000000" pitchFamily="2" charset="2"/>
+              <a:buChar char="§"/>
+            </a:pPr>
+            <a:r>
+              <a:rPr lang="en-US" dirty="0"/>
+              <a:t>Second Pass: Removing garbage time data</a:t>
             </a:r>
           </a:p>
           <a:p>
@@ -5131,7 +5026,7 @@
             </a:pPr>
             <a:r>
               <a:rPr lang="en-US" dirty="0"/>
-              <a:t>Time of possession</a:t>
+              <a:t>No correlation between passes per run (in competitive situations) and win rate</a:t>
             </a:r>
           </a:p>
           <a:p>
@@ -5141,7 +5036,17 @@
             </a:pPr>
             <a:r>
               <a:rPr lang="en-US" dirty="0"/>
-              <a:t>Red zone success</a:t>
+              <a:t>R-Squared Value: -0.18</a:t>
+            </a:r>
+          </a:p>
+          <a:p>
+            <a:pPr fontAlgn="base">
+              <a:buFont typeface="Wingdings" panose="05000000000000000000" pitchFamily="2" charset="2"/>
+              <a:buChar char="§"/>
+            </a:pPr>
+            <a:r>
+              <a:rPr lang="en-US" dirty="0"/>
+              <a:t>Third Pass: Comparison to S&amp;P+ Rating</a:t>
             </a:r>
           </a:p>
           <a:p>
@@ -5151,16 +5056,17 @@
             </a:pPr>
             <a:r>
               <a:rPr lang="en-US" dirty="0"/>
-              <a:t>3rd down conversion rate</a:t>
-            </a:r>
-          </a:p>
-          <a:p>
-            <a:pPr marL="0" indent="0" fontAlgn="base">
-              <a:buNone/>
+              <a:t>No correlation between passes per run (in competitive situations) and win rate</a:t>
+            </a:r>
+          </a:p>
+          <a:p>
+            <a:pPr lvl="1" fontAlgn="base">
+              <a:buFont typeface="Arial" panose="020B0604020202020204" pitchFamily="34" charset="0"/>
+              <a:buChar char="•"/>
             </a:pPr>
             <a:r>
               <a:rPr lang="en-US" dirty="0"/>
-              <a:t>Would a grouping by coach be a better way to look at the data?</a:t>
+              <a:t>R-Squared Value: -0.13</a:t>
             </a:r>
           </a:p>
         </p:txBody>
@@ -5168,7 +5074,7 @@
     </p:spTree>
     <p:extLst>
       <p:ext uri="{BB962C8B-B14F-4D97-AF65-F5344CB8AC3E}">
-        <p14:creationId xmlns:p14="http://schemas.microsoft.com/office/powerpoint/2010/main" val="3276172193"/>
+        <p14:creationId xmlns:p14="http://schemas.microsoft.com/office/powerpoint/2010/main" val="2780420744"/>
       </p:ext>
     </p:extLst>
   </p:cSld>
@@ -5316,6 +5222,167 @@
     <p:extLst>
       <p:ext uri="{BB962C8B-B14F-4D97-AF65-F5344CB8AC3E}">
         <p14:creationId xmlns:p14="http://schemas.microsoft.com/office/powerpoint/2010/main" val="4257993141"/>
+      </p:ext>
+    </p:extLst>
+  </p:cSld>
+  <p:clrMapOvr>
+    <a:masterClrMapping/>
+  </p:clrMapOvr>
+</p:sld>
+</file>
+
+<file path=ppt/slides/slide20.xml><?xml version="1.0" encoding="utf-8"?>
+<p:sld xmlns:a="http://schemas.openxmlformats.org/drawingml/2006/main" xmlns:r="http://schemas.openxmlformats.org/officeDocument/2006/relationships" xmlns:p="http://schemas.openxmlformats.org/presentationml/2006/main">
+  <p:cSld>
+    <p:spTree>
+      <p:nvGrpSpPr>
+        <p:cNvPr id="1" name=""/>
+        <p:cNvGrpSpPr/>
+        <p:nvPr/>
+      </p:nvGrpSpPr>
+      <p:grpSpPr>
+        <a:xfrm>
+          <a:off x="0" y="0"/>
+          <a:ext cx="0" cy="0"/>
+          <a:chOff x="0" y="0"/>
+          <a:chExt cx="0" cy="0"/>
+        </a:xfrm>
+      </p:grpSpPr>
+      <p:sp>
+        <p:nvSpPr>
+          <p:cNvPr id="2" name="Title 1">
+            <a:extLst>
+              <a:ext uri="{FF2B5EF4-FFF2-40B4-BE49-F238E27FC236}">
+                <a16:creationId xmlns:a16="http://schemas.microsoft.com/office/drawing/2014/main" id="{250023F7-5D99-4925-A6A8-DE7183EF5DC3}"/>
+              </a:ext>
+            </a:extLst>
+          </p:cNvPr>
+          <p:cNvSpPr>
+            <a:spLocks noGrp="1"/>
+          </p:cNvSpPr>
+          <p:nvPr>
+            <p:ph type="title"/>
+          </p:nvPr>
+        </p:nvSpPr>
+        <p:spPr/>
+        <p:txBody>
+          <a:bodyPr/>
+          <a:lstStyle/>
+          <a:p>
+            <a:r>
+              <a:rPr lang="en-US" b="1"/>
+              <a:t>Further </a:t>
+            </a:r>
+            <a:r>
+              <a:rPr lang="en-US" b="1" dirty="0"/>
+              <a:t>Questions</a:t>
+            </a:r>
+          </a:p>
+        </p:txBody>
+      </p:sp>
+      <p:sp>
+        <p:nvSpPr>
+          <p:cNvPr id="3" name="Content Placeholder 2">
+            <a:extLst>
+              <a:ext uri="{FF2B5EF4-FFF2-40B4-BE49-F238E27FC236}">
+                <a16:creationId xmlns:a16="http://schemas.microsoft.com/office/drawing/2014/main" id="{FC5ECB44-71F2-4928-AA01-11D3CC942685}"/>
+              </a:ext>
+            </a:extLst>
+          </p:cNvPr>
+          <p:cNvSpPr>
+            <a:spLocks noGrp="1"/>
+          </p:cNvSpPr>
+          <p:nvPr>
+            <p:ph idx="1"/>
+          </p:nvPr>
+        </p:nvSpPr>
+        <p:spPr/>
+        <p:txBody>
+          <a:bodyPr/>
+          <a:lstStyle/>
+          <a:p>
+            <a:pPr marL="0" indent="0" fontAlgn="base">
+              <a:buNone/>
+            </a:pPr>
+            <a:r>
+              <a:rPr lang="en-US" dirty="0"/>
+              <a:t>Could this data be better explored by doing a series of case studies on schools that might show variances in these data in the same team?</a:t>
+            </a:r>
+          </a:p>
+          <a:p>
+            <a:pPr lvl="1" fontAlgn="base">
+              <a:buFont typeface="Arial" panose="020B0604020202020204" pitchFamily="34" charset="0"/>
+              <a:buChar char="•"/>
+            </a:pPr>
+            <a:r>
+              <a:rPr lang="en-US" dirty="0"/>
+              <a:t>For example: Clemson or Alabama</a:t>
+            </a:r>
+          </a:p>
+          <a:p>
+            <a:pPr marL="0" indent="0" fontAlgn="base">
+              <a:buNone/>
+            </a:pPr>
+            <a:r>
+              <a:rPr lang="en-US" dirty="0"/>
+              <a:t>Are there other predictive measures that have a better correlation to our success outcomes?</a:t>
+            </a:r>
+          </a:p>
+          <a:p>
+            <a:pPr lvl="1" fontAlgn="base">
+              <a:buFont typeface="Arial" panose="020B0604020202020204" pitchFamily="34" charset="0"/>
+              <a:buChar char="•"/>
+            </a:pPr>
+            <a:r>
+              <a:rPr lang="en-US" dirty="0"/>
+              <a:t>Turnovers</a:t>
+            </a:r>
+          </a:p>
+          <a:p>
+            <a:pPr lvl="1" fontAlgn="base">
+              <a:buFont typeface="Arial" panose="020B0604020202020204" pitchFamily="34" charset="0"/>
+              <a:buChar char="•"/>
+            </a:pPr>
+            <a:r>
+              <a:rPr lang="en-US" dirty="0"/>
+              <a:t>Time of possession</a:t>
+            </a:r>
+          </a:p>
+          <a:p>
+            <a:pPr lvl="1" fontAlgn="base">
+              <a:buFont typeface="Arial" panose="020B0604020202020204" pitchFamily="34" charset="0"/>
+              <a:buChar char="•"/>
+            </a:pPr>
+            <a:r>
+              <a:rPr lang="en-US" dirty="0"/>
+              <a:t>Red zone success</a:t>
+            </a:r>
+          </a:p>
+          <a:p>
+            <a:pPr lvl="1" fontAlgn="base">
+              <a:buFont typeface="Arial" panose="020B0604020202020204" pitchFamily="34" charset="0"/>
+              <a:buChar char="•"/>
+            </a:pPr>
+            <a:r>
+              <a:rPr lang="en-US" dirty="0"/>
+              <a:t>3rd down conversion rate</a:t>
+            </a:r>
+          </a:p>
+          <a:p>
+            <a:pPr marL="0" indent="0" fontAlgn="base">
+              <a:buNone/>
+            </a:pPr>
+            <a:r>
+              <a:rPr lang="en-US" dirty="0"/>
+              <a:t>Would a grouping by coach be a better way to look at the data?</a:t>
+            </a:r>
+          </a:p>
+        </p:txBody>
+      </p:sp>
+    </p:spTree>
+    <p:extLst>
+      <p:ext uri="{BB962C8B-B14F-4D97-AF65-F5344CB8AC3E}">
+        <p14:creationId xmlns:p14="http://schemas.microsoft.com/office/powerpoint/2010/main" val="3276172193"/>
       </p:ext>
     </p:extLst>
   </p:cSld>
@@ -5657,7 +5724,7 @@
         </p:nvSpPr>
         <p:spPr/>
         <p:txBody>
-          <a:bodyPr>
+          <a:bodyPr numCol="2">
             <a:normAutofit/>
           </a:bodyPr>
           <a:lstStyle/>
@@ -5728,7 +5795,87 @@
               <a:rPr lang="en-US" sz="2400" b="1" dirty="0"/>
               <a:t>   </a:t>
             </a:r>
-            <a:endParaRPr lang="en-US" sz="2400" dirty="0"/>
+          </a:p>
+          <a:p>
+            <a:pPr lvl="1" fontAlgn="base">
+              <a:buFont typeface="Arial" panose="020B0604020202020204" pitchFamily="34" charset="0"/>
+              <a:buChar char="•"/>
+            </a:pPr>
+            <a:endParaRPr lang="en-US" sz="2400" b="1" dirty="0"/>
+          </a:p>
+          <a:p>
+            <a:pPr lvl="1" fontAlgn="base">
+              <a:buFont typeface="Arial" panose="020B0604020202020204" pitchFamily="34" charset="0"/>
+              <a:buChar char="•"/>
+            </a:pPr>
+            <a:endParaRPr lang="en-US" sz="2400" b="1" dirty="0"/>
+          </a:p>
+          <a:p>
+            <a:pPr marL="0" fontAlgn="base">
+              <a:buNone/>
+            </a:pPr>
+            <a:r>
+              <a:rPr lang="en-US" sz="2600" b="1" dirty="0"/>
+              <a:t>Methods</a:t>
+            </a:r>
+          </a:p>
+          <a:p>
+            <a:pPr marL="452628" lvl="1" indent="-342900" fontAlgn="base">
+              <a:buFont typeface="Arial" panose="020B0604020202020204" pitchFamily="34" charset="0"/>
+              <a:buChar char="•"/>
+            </a:pPr>
+            <a:r>
+              <a:rPr lang="en-US" sz="2400" b="1" dirty="0"/>
+              <a:t>Linear regression</a:t>
+            </a:r>
+          </a:p>
+          <a:p>
+            <a:pPr marL="452628" lvl="1" indent="-342900" fontAlgn="base">
+              <a:buFont typeface="Arial" panose="020B0604020202020204" pitchFamily="34" charset="0"/>
+              <a:buChar char="•"/>
+            </a:pPr>
+            <a:r>
+              <a:rPr lang="en-US" sz="2400" b="1" dirty="0"/>
+              <a:t>Binning</a:t>
+            </a:r>
+          </a:p>
+          <a:p>
+            <a:pPr marL="452628" lvl="1" indent="-342900" fontAlgn="base">
+              <a:buFont typeface="Arial" panose="020B0604020202020204" pitchFamily="34" charset="0"/>
+              <a:buChar char="•"/>
+            </a:pPr>
+            <a:r>
+              <a:rPr lang="en-US" sz="2400" b="1" dirty="0"/>
+              <a:t>Plots</a:t>
+            </a:r>
+          </a:p>
+          <a:p>
+            <a:pPr marL="475488" lvl="3" indent="0" fontAlgn="base">
+              <a:buNone/>
+            </a:pPr>
+            <a:r>
+              <a:rPr lang="en-US" sz="2000" b="1" dirty="0"/>
+              <a:t>Histogram</a:t>
+            </a:r>
+          </a:p>
+          <a:p>
+            <a:pPr marL="475488" lvl="3" indent="0" fontAlgn="base">
+              <a:buNone/>
+            </a:pPr>
+            <a:r>
+              <a:rPr lang="en-US" sz="2000" b="1" dirty="0"/>
+              <a:t>Scatter Plot</a:t>
+            </a:r>
+          </a:p>
+          <a:p>
+            <a:pPr marL="475488" lvl="3" indent="0" fontAlgn="base">
+              <a:buNone/>
+            </a:pPr>
+            <a:r>
+              <a:rPr lang="en-US" sz="2000" b="1" dirty="0"/>
+              <a:t>Line Plot</a:t>
+            </a:r>
+            <a:endParaRPr lang="en-US" sz="2000" dirty="0"/>
           </a:p>
         </p:txBody>
       </p:sp>
@@ -5764,10 +5911,10 @@
       </p:grpSpPr>
       <p:pic>
         <p:nvPicPr>
-          <p:cNvPr id="9" name="Picture 8" descr="A close up of a map&#10;&#10;Description automatically generated">
+          <p:cNvPr id="3" name="Picture 2" descr="A picture containing text, group, large, flying&#10;&#10;Description automatically generated">
             <a:extLst>
               <a:ext uri="{FF2B5EF4-FFF2-40B4-BE49-F238E27FC236}">
-                <a16:creationId xmlns:a16="http://schemas.microsoft.com/office/drawing/2014/main" id="{577B3C92-7C3A-49B4-9A52-234D164FBBB6}"/>
+                <a16:creationId xmlns:a16="http://schemas.microsoft.com/office/drawing/2014/main" id="{5941FCC1-753F-453B-BBA9-E3723B940354}"/>
               </a:ext>
             </a:extLst>
           </p:cNvPr>
@@ -5830,10 +5977,10 @@
       </p:grpSpPr>
       <p:pic>
         <p:nvPicPr>
-          <p:cNvPr id="3" name="Picture 2" descr="A picture containing group, filled, different, many&#10;&#10;Description automatically generated">
+          <p:cNvPr id="4" name="Picture 3" descr="A picture containing different, many, table, group&#10;&#10;Description automatically generated">
             <a:extLst>
               <a:ext uri="{FF2B5EF4-FFF2-40B4-BE49-F238E27FC236}">
-                <a16:creationId xmlns:a16="http://schemas.microsoft.com/office/drawing/2014/main" id="{151395FF-E7B0-4B1D-90B0-C46FDF6092E1}"/>
+                <a16:creationId xmlns:a16="http://schemas.microsoft.com/office/drawing/2014/main" id="{4083DF69-BA8F-43CA-B428-DD6A3FF386CE}"/>
               </a:ext>
             </a:extLst>
           </p:cNvPr>
@@ -5896,10 +6043,10 @@
       </p:grpSpPr>
       <p:pic>
         <p:nvPicPr>
-          <p:cNvPr id="5" name="Picture 4" descr="A picture containing water, different, boat, various&#10;&#10;Description automatically generated">
+          <p:cNvPr id="3" name="Picture 2" descr="A picture containing different, table, skiing, group&#10;&#10;Description automatically generated">
             <a:extLst>
               <a:ext uri="{FF2B5EF4-FFF2-40B4-BE49-F238E27FC236}">
-                <a16:creationId xmlns:a16="http://schemas.microsoft.com/office/drawing/2014/main" id="{C64DB9BF-5BDF-4527-937F-E370F2CE15A7}"/>
+                <a16:creationId xmlns:a16="http://schemas.microsoft.com/office/drawing/2014/main" id="{35FD2EB0-3427-4A42-B564-741C3B299DC7}"/>
               </a:ext>
             </a:extLst>
           </p:cNvPr>
@@ -5962,10 +6109,10 @@
       </p:grpSpPr>
       <p:pic>
         <p:nvPicPr>
-          <p:cNvPr id="3" name="Picture 2" descr="A picture containing filled, different, group, water&#10;&#10;Description automatically generated">
+          <p:cNvPr id="4" name="Picture 3" descr="A picture containing water, small, different, skiing&#10;&#10;Description automatically generated">
             <a:extLst>
               <a:ext uri="{FF2B5EF4-FFF2-40B4-BE49-F238E27FC236}">
-                <a16:creationId xmlns:a16="http://schemas.microsoft.com/office/drawing/2014/main" id="{ACD5F722-1536-4841-B0D7-48642303C6C0}"/>
+                <a16:creationId xmlns:a16="http://schemas.microsoft.com/office/drawing/2014/main" id="{41460CC7-DACE-45C4-9066-35874C1D1AF4}"/>
               </a:ext>
             </a:extLst>
           </p:cNvPr>
@@ -6028,10 +6175,10 @@
       </p:grpSpPr>
       <p:pic>
         <p:nvPicPr>
-          <p:cNvPr id="3" name="Picture 2" descr="A close up of a map&#10;&#10;Description automatically generated">
+          <p:cNvPr id="3" name="Picture 2" descr="A picture containing different, man, water, flying&#10;&#10;Description automatically generated">
             <a:extLst>
               <a:ext uri="{FF2B5EF4-FFF2-40B4-BE49-F238E27FC236}">
-                <a16:creationId xmlns:a16="http://schemas.microsoft.com/office/drawing/2014/main" id="{37F5FB71-DE7D-4345-AA3C-9B999F4D5FD0}"/>
+                <a16:creationId xmlns:a16="http://schemas.microsoft.com/office/drawing/2014/main" id="{BD6F696C-6402-43FD-9E7A-A2F2ACA8FBB0}"/>
               </a:ext>
             </a:extLst>
           </p:cNvPr>
@@ -6065,7 +6212,7 @@
     </p:spTree>
     <p:extLst>
       <p:ext uri="{BB962C8B-B14F-4D97-AF65-F5344CB8AC3E}">
-        <p14:creationId xmlns:p14="http://schemas.microsoft.com/office/powerpoint/2010/main" val="1597046657"/>
+        <p14:creationId xmlns:p14="http://schemas.microsoft.com/office/powerpoint/2010/main" val="337884770"/>
       </p:ext>
     </p:extLst>
   </p:cSld>

</xml_diff>

<commit_message>
actually final powerpoint, added quesitons slide
</commit_message>
<xml_diff>
--- a/CFBPresentation.pptx
+++ b/CFBPresentation.pptx
@@ -3872,19 +3872,19 @@
           <a:lstStyle/>
           <a:p>
             <a:r>
-              <a:rPr lang="en-US"/>
+              <a:rPr lang="en-US" b="1" dirty="0"/>
               <a:t>Nathan Kosiba</a:t>
             </a:r>
           </a:p>
           <a:p>
             <a:r>
-              <a:rPr lang="en-US"/>
+              <a:rPr lang="en-US" b="1" dirty="0"/>
               <a:t>Spencer Harrison</a:t>
             </a:r>
           </a:p>
           <a:p>
             <a:r>
-              <a:rPr lang="en-US"/>
+              <a:rPr lang="en-US" b="1" dirty="0"/>
               <a:t>Brendan Dowd</a:t>
             </a:r>
           </a:p>
@@ -5080,11 +5080,14 @@
         </p:nvSpPr>
         <p:spPr/>
         <p:txBody>
-          <a:bodyPr/>
+          <a:bodyPr>
+            <a:normAutofit/>
+          </a:bodyPr>
           <a:lstStyle/>
           <a:p>
-            <a:r>
-              <a:rPr lang="en-US" dirty="0"/>
+            <a:pPr algn="ctr"/>
+            <a:r>
+              <a:rPr lang="en-US" sz="9600" b="1" dirty="0"/>
               <a:t>Questions?</a:t>
             </a:r>
           </a:p>
@@ -5123,7 +5126,7 @@
         </p:blipFill>
         <p:spPr>
           <a:xfrm>
-            <a:off x="3848894" y="1601788"/>
+            <a:off x="3848894" y="1737360"/>
             <a:ext cx="4494212" cy="4494212"/>
           </a:xfrm>
         </p:spPr>

</xml_diff>